<commit_message>
added updates in architecture diagrams
</commit_message>
<xml_diff>
--- a/sk-mcp-hollow-poc/Simple-MCP-Agent-Hollow-POC-Architecture.pptx
+++ b/sk-mcp-hollow-poc/Simple-MCP-Agent-Hollow-POC-Architecture.pptx
@@ -10,27 +10,27 @@
   <p:sldIdLst>
     <p:sldId id="274" r:id="rId2"/>
     <p:sldId id="275" r:id="rId3"/>
-    <p:sldId id="272" r:id="rId4"/>
-    <p:sldId id="269" r:id="rId5"/>
-    <p:sldId id="271" r:id="rId6"/>
-    <p:sldId id="270" r:id="rId7"/>
-    <p:sldId id="273" r:id="rId8"/>
-    <p:sldId id="263" r:id="rId9"/>
-    <p:sldId id="261" r:id="rId10"/>
-    <p:sldId id="262" r:id="rId11"/>
-    <p:sldId id="264" r:id="rId12"/>
-    <p:sldId id="265" r:id="rId13"/>
-    <p:sldId id="266" r:id="rId14"/>
-    <p:sldId id="267" r:id="rId15"/>
-    <p:sldId id="268" r:id="rId16"/>
-    <p:sldId id="256" r:id="rId17"/>
-    <p:sldId id="257" r:id="rId18"/>
-    <p:sldId id="258" r:id="rId19"/>
-    <p:sldId id="259" r:id="rId20"/>
-    <p:sldId id="260" r:id="rId21"/>
-    <p:sldId id="276" r:id="rId22"/>
-    <p:sldId id="278" r:id="rId23"/>
-    <p:sldId id="277" r:id="rId24"/>
+    <p:sldId id="269" r:id="rId4"/>
+    <p:sldId id="271" r:id="rId5"/>
+    <p:sldId id="270" r:id="rId6"/>
+    <p:sldId id="273" r:id="rId7"/>
+    <p:sldId id="263" r:id="rId8"/>
+    <p:sldId id="261" r:id="rId9"/>
+    <p:sldId id="262" r:id="rId10"/>
+    <p:sldId id="264" r:id="rId11"/>
+    <p:sldId id="265" r:id="rId12"/>
+    <p:sldId id="266" r:id="rId13"/>
+    <p:sldId id="267" r:id="rId14"/>
+    <p:sldId id="268" r:id="rId15"/>
+    <p:sldId id="256" r:id="rId16"/>
+    <p:sldId id="257" r:id="rId17"/>
+    <p:sldId id="258" r:id="rId18"/>
+    <p:sldId id="259" r:id="rId19"/>
+    <p:sldId id="260" r:id="rId20"/>
+    <p:sldId id="276" r:id="rId21"/>
+    <p:sldId id="278" r:id="rId22"/>
+    <p:sldId id="277" r:id="rId23"/>
+    <p:sldId id="272" r:id="rId24"/>
   </p:sldIdLst>
   <p:sldSz cx="12192000" cy="6858000"/>
   <p:notesSz cx="6858000" cy="9144000"/>
@@ -219,7 +219,7 @@
           <a:p>
             <a:fld id="{17C0FFDD-2F91-4327-83DF-AC11DEFCAA33}" type="datetimeFigureOut">
               <a:rPr lang="en-US" smtClean="0"/>
-              <a:t>6/4/2025</a:t>
+              <a:t>6/11/2025</a:t>
             </a:fld>
             <a:endParaRPr lang="en-US"/>
           </a:p>
@@ -825,7 +825,7 @@
           <a:p>
             <a:fld id="{F3562317-0748-4C3E-8EEC-4AF870B98677}" type="datetimeFigureOut">
               <a:rPr lang="en-US" smtClean="0"/>
-              <a:t>6/4/2025</a:t>
+              <a:t>6/11/2025</a:t>
             </a:fld>
             <a:endParaRPr lang="en-US"/>
           </a:p>
@@ -1023,7 +1023,7 @@
           <a:p>
             <a:fld id="{F3562317-0748-4C3E-8EEC-4AF870B98677}" type="datetimeFigureOut">
               <a:rPr lang="en-US" smtClean="0"/>
-              <a:t>6/4/2025</a:t>
+              <a:t>6/11/2025</a:t>
             </a:fld>
             <a:endParaRPr lang="en-US"/>
           </a:p>
@@ -1231,7 +1231,7 @@
           <a:p>
             <a:fld id="{F3562317-0748-4C3E-8EEC-4AF870B98677}" type="datetimeFigureOut">
               <a:rPr lang="en-US" smtClean="0"/>
-              <a:t>6/4/2025</a:t>
+              <a:t>6/11/2025</a:t>
             </a:fld>
             <a:endParaRPr lang="en-US"/>
           </a:p>
@@ -1429,7 +1429,7 @@
           <a:p>
             <a:fld id="{F3562317-0748-4C3E-8EEC-4AF870B98677}" type="datetimeFigureOut">
               <a:rPr lang="en-US" smtClean="0"/>
-              <a:t>6/4/2025</a:t>
+              <a:t>6/11/2025</a:t>
             </a:fld>
             <a:endParaRPr lang="en-US"/>
           </a:p>
@@ -1704,7 +1704,7 @@
           <a:p>
             <a:fld id="{F3562317-0748-4C3E-8EEC-4AF870B98677}" type="datetimeFigureOut">
               <a:rPr lang="en-US" smtClean="0"/>
-              <a:t>6/4/2025</a:t>
+              <a:t>6/11/2025</a:t>
             </a:fld>
             <a:endParaRPr lang="en-US"/>
           </a:p>
@@ -1969,7 +1969,7 @@
           <a:p>
             <a:fld id="{F3562317-0748-4C3E-8EEC-4AF870B98677}" type="datetimeFigureOut">
               <a:rPr lang="en-US" smtClean="0"/>
-              <a:t>6/4/2025</a:t>
+              <a:t>6/11/2025</a:t>
             </a:fld>
             <a:endParaRPr lang="en-US"/>
           </a:p>
@@ -2381,7 +2381,7 @@
           <a:p>
             <a:fld id="{F3562317-0748-4C3E-8EEC-4AF870B98677}" type="datetimeFigureOut">
               <a:rPr lang="en-US" smtClean="0"/>
-              <a:t>6/4/2025</a:t>
+              <a:t>6/11/2025</a:t>
             </a:fld>
             <a:endParaRPr lang="en-US"/>
           </a:p>
@@ -2522,7 +2522,7 @@
           <a:p>
             <a:fld id="{F3562317-0748-4C3E-8EEC-4AF870B98677}" type="datetimeFigureOut">
               <a:rPr lang="en-US" smtClean="0"/>
-              <a:t>6/4/2025</a:t>
+              <a:t>6/11/2025</a:t>
             </a:fld>
             <a:endParaRPr lang="en-US"/>
           </a:p>
@@ -2635,7 +2635,7 @@
           <a:p>
             <a:fld id="{F3562317-0748-4C3E-8EEC-4AF870B98677}" type="datetimeFigureOut">
               <a:rPr lang="en-US" smtClean="0"/>
-              <a:t>6/4/2025</a:t>
+              <a:t>6/11/2025</a:t>
             </a:fld>
             <a:endParaRPr lang="en-US"/>
           </a:p>
@@ -2946,7 +2946,7 @@
           <a:p>
             <a:fld id="{F3562317-0748-4C3E-8EEC-4AF870B98677}" type="datetimeFigureOut">
               <a:rPr lang="en-US" smtClean="0"/>
-              <a:t>6/4/2025</a:t>
+              <a:t>6/11/2025</a:t>
             </a:fld>
             <a:endParaRPr lang="en-US"/>
           </a:p>
@@ -3234,7 +3234,7 @@
           <a:p>
             <a:fld id="{F3562317-0748-4C3E-8EEC-4AF870B98677}" type="datetimeFigureOut">
               <a:rPr lang="en-US" smtClean="0"/>
-              <a:t>6/4/2025</a:t>
+              <a:t>6/11/2025</a:t>
             </a:fld>
             <a:endParaRPr lang="en-US"/>
           </a:p>
@@ -3475,7 +3475,7 @@
           <a:p>
             <a:fld id="{F3562317-0748-4C3E-8EEC-4AF870B98677}" type="datetimeFigureOut">
               <a:rPr lang="en-US" smtClean="0"/>
-              <a:t>6/4/2025</a:t>
+              <a:t>6/11/2025</a:t>
             </a:fld>
             <a:endParaRPr lang="en-US"/>
           </a:p>
@@ -6058,133 +6058,6 @@
           <a:chExt cx="0" cy="0"/>
         </a:xfrm>
       </p:grpSpPr>
-      <p:sp>
-        <p:nvSpPr>
-          <p:cNvPr id="2" name="Title 1">
-            <a:extLst>
-              <a:ext uri="{FF2B5EF4-FFF2-40B4-BE49-F238E27FC236}">
-                <a16:creationId xmlns:a16="http://schemas.microsoft.com/office/drawing/2014/main" id="{18F2992B-CA16-F732-78BE-ADAF881FB173}"/>
-              </a:ext>
-            </a:extLst>
-          </p:cNvPr>
-          <p:cNvSpPr>
-            <a:spLocks noGrp="1"/>
-          </p:cNvSpPr>
-          <p:nvPr>
-            <p:ph type="title"/>
-          </p:nvPr>
-        </p:nvSpPr>
-        <p:spPr/>
-        <p:txBody>
-          <a:bodyPr/>
-          <a:lstStyle/>
-          <a:p>
-            <a:endParaRPr lang="en-US"/>
-          </a:p>
-        </p:txBody>
-      </p:sp>
-      <p:sp>
-        <p:nvSpPr>
-          <p:cNvPr id="3" name="Content Placeholder 2">
-            <a:extLst>
-              <a:ext uri="{FF2B5EF4-FFF2-40B4-BE49-F238E27FC236}">
-                <a16:creationId xmlns:a16="http://schemas.microsoft.com/office/drawing/2014/main" id="{85255165-55C0-639B-ADB5-8B2D62865387}"/>
-              </a:ext>
-            </a:extLst>
-          </p:cNvPr>
-          <p:cNvSpPr>
-            <a:spLocks noGrp="1"/>
-          </p:cNvSpPr>
-          <p:nvPr>
-            <p:ph idx="1"/>
-          </p:nvPr>
-        </p:nvSpPr>
-        <p:spPr/>
-        <p:txBody>
-          <a:bodyPr/>
-          <a:lstStyle/>
-          <a:p>
-            <a:endParaRPr lang="en-US"/>
-          </a:p>
-        </p:txBody>
-      </p:sp>
-      <p:pic>
-        <p:nvPicPr>
-          <p:cNvPr id="7170" name="Picture 2" descr="Agent Chat Example">
-            <a:extLst>
-              <a:ext uri="{FF2B5EF4-FFF2-40B4-BE49-F238E27FC236}">
-                <a16:creationId xmlns:a16="http://schemas.microsoft.com/office/drawing/2014/main" id="{7D1FE7EF-6D52-914B-EFF1-17A8E2B8258A}"/>
-              </a:ext>
-            </a:extLst>
-          </p:cNvPr>
-          <p:cNvPicPr>
-            <a:picLocks noChangeAspect="1" noChangeArrowheads="1"/>
-          </p:cNvPicPr>
-          <p:nvPr/>
-        </p:nvPicPr>
-        <p:blipFill>
-          <a:blip r:embed="rId2">
-            <a:extLst>
-              <a:ext uri="{28A0092B-C50C-407E-A947-70E740481C1C}">
-                <a14:useLocalDpi xmlns:a14="http://schemas.microsoft.com/office/drawing/2010/main" val="0"/>
-              </a:ext>
-            </a:extLst>
-          </a:blip>
-          <a:srcRect/>
-          <a:stretch>
-            <a:fillRect/>
-          </a:stretch>
-        </p:blipFill>
-        <p:spPr bwMode="auto">
-          <a:xfrm>
-            <a:off x="0" y="176213"/>
-            <a:ext cx="12192000" cy="6505575"/>
-          </a:xfrm>
-          <a:prstGeom prst="rect">
-            <a:avLst/>
-          </a:prstGeom>
-          <a:noFill/>
-          <a:extLst>
-            <a:ext uri="{909E8E84-426E-40DD-AFC4-6F175D3DCCD1}">
-              <a14:hiddenFill xmlns:a14="http://schemas.microsoft.com/office/drawing/2010/main">
-                <a:solidFill>
-                  <a:srgbClr val="FFFFFF"/>
-                </a:solidFill>
-              </a14:hiddenFill>
-            </a:ext>
-          </a:extLst>
-        </p:spPr>
-      </p:pic>
-    </p:spTree>
-    <p:extLst>
-      <p:ext uri="{BB962C8B-B14F-4D97-AF65-F5344CB8AC3E}">
-        <p14:creationId xmlns:p14="http://schemas.microsoft.com/office/powerpoint/2010/main" val="1520221962"/>
-      </p:ext>
-    </p:extLst>
-  </p:cSld>
-  <p:clrMapOvr>
-    <a:masterClrMapping/>
-  </p:clrMapOvr>
-</p:sld>
-</file>
-
-<file path=ppt/slides/slide11.xml><?xml version="1.0" encoding="utf-8"?>
-<p:sld xmlns:a="http://schemas.openxmlformats.org/drawingml/2006/main" xmlns:r="http://schemas.openxmlformats.org/officeDocument/2006/relationships" xmlns:p="http://schemas.openxmlformats.org/presentationml/2006/main">
-  <p:cSld>
-    <p:spTree>
-      <p:nvGrpSpPr>
-        <p:cNvPr id="1" name=""/>
-        <p:cNvGrpSpPr/>
-        <p:nvPr/>
-      </p:nvGrpSpPr>
-      <p:grpSpPr>
-        <a:xfrm>
-          <a:off x="0" y="0"/>
-          <a:ext cx="0" cy="0"/>
-          <a:chOff x="0" y="0"/>
-          <a:chExt cx="0" cy="0"/>
-        </a:xfrm>
-      </p:grpSpPr>
       <p:pic>
         <p:nvPicPr>
           <p:cNvPr id="9218" name="Picture 2" descr="diagram">
@@ -6482,7 +6355,7 @@
 </p:sld>
 </file>
 
-<file path=ppt/slides/slide12.xml><?xml version="1.0" encoding="utf-8"?>
+<file path=ppt/slides/slide11.xml><?xml version="1.0" encoding="utf-8"?>
 <p:sld xmlns:a="http://schemas.openxmlformats.org/drawingml/2006/main" xmlns:r="http://schemas.openxmlformats.org/officeDocument/2006/relationships" xmlns:p="http://schemas.openxmlformats.org/presentationml/2006/main">
   <p:cSld>
     <p:spTree>
@@ -6758,7 +6631,7 @@
 </p:sld>
 </file>
 
-<file path=ppt/slides/slide13.xml><?xml version="1.0" encoding="utf-8"?>
+<file path=ppt/slides/slide12.xml><?xml version="1.0" encoding="utf-8"?>
 <p:sld xmlns:a="http://schemas.openxmlformats.org/drawingml/2006/main" xmlns:r="http://schemas.openxmlformats.org/officeDocument/2006/relationships" xmlns:p="http://schemas.openxmlformats.org/presentationml/2006/main">
   <p:cSld>
     <p:spTree>
@@ -7034,7 +6907,7 @@
 </p:sld>
 </file>
 
-<file path=ppt/slides/slide14.xml><?xml version="1.0" encoding="utf-8"?>
+<file path=ppt/slides/slide13.xml><?xml version="1.0" encoding="utf-8"?>
 <p:sld xmlns:a="http://schemas.openxmlformats.org/drawingml/2006/main" xmlns:r="http://schemas.openxmlformats.org/officeDocument/2006/relationships" xmlns:p="http://schemas.openxmlformats.org/presentationml/2006/main">
   <p:cSld>
     <p:spTree>
@@ -7310,6 +7183,127 @@
 </p:sld>
 </file>
 
+<file path=ppt/slides/slide14.xml><?xml version="1.0" encoding="utf-8"?>
+<p:sld xmlns:a="http://schemas.openxmlformats.org/drawingml/2006/main" xmlns:r="http://schemas.openxmlformats.org/officeDocument/2006/relationships" xmlns:p="http://schemas.openxmlformats.org/presentationml/2006/main">
+  <p:cSld>
+    <p:spTree>
+      <p:nvGrpSpPr>
+        <p:cNvPr id="1" name=""/>
+        <p:cNvGrpSpPr/>
+        <p:nvPr/>
+      </p:nvGrpSpPr>
+      <p:grpSpPr>
+        <a:xfrm>
+          <a:off x="0" y="0"/>
+          <a:ext cx="0" cy="0"/>
+          <a:chOff x="0" y="0"/>
+          <a:chExt cx="0" cy="0"/>
+        </a:xfrm>
+      </p:grpSpPr>
+      <p:sp>
+        <p:nvSpPr>
+          <p:cNvPr id="2" name="Title 1">
+            <a:extLst>
+              <a:ext uri="{FF2B5EF4-FFF2-40B4-BE49-F238E27FC236}">
+                <a16:creationId xmlns:a16="http://schemas.microsoft.com/office/drawing/2014/main" id="{58A0D026-A688-D81C-FEEB-C5D9743EEA48}"/>
+              </a:ext>
+            </a:extLst>
+          </p:cNvPr>
+          <p:cNvSpPr>
+            <a:spLocks noGrp="1"/>
+          </p:cNvSpPr>
+          <p:nvPr>
+            <p:ph type="title"/>
+          </p:nvPr>
+        </p:nvSpPr>
+        <p:spPr>
+          <a:xfrm>
+            <a:off x="838200" y="113917"/>
+            <a:ext cx="10515600" cy="720097"/>
+          </a:xfrm>
+        </p:spPr>
+        <p:txBody>
+          <a:bodyPr>
+            <a:normAutofit/>
+          </a:bodyPr>
+          <a:lstStyle/>
+          <a:p>
+            <a:r>
+              <a:rPr lang="en-US" sz="4000" dirty="0" err="1">
+                <a:hlinkClick r:id="rId2"/>
+              </a:rPr>
+              <a:t>Magentic</a:t>
+            </a:r>
+            <a:r>
+              <a:rPr lang="en-US" sz="4000" dirty="0">
+                <a:hlinkClick r:id="rId2"/>
+              </a:rPr>
+              <a:t> Agent Orchestration | Microsoft Learn</a:t>
+            </a:r>
+            <a:endParaRPr lang="en-US" sz="4000" dirty="0"/>
+          </a:p>
+        </p:txBody>
+      </p:sp>
+      <p:pic>
+        <p:nvPicPr>
+          <p:cNvPr id="13314" name="Picture 2" descr="diagram">
+            <a:extLst>
+              <a:ext uri="{FF2B5EF4-FFF2-40B4-BE49-F238E27FC236}">
+                <a16:creationId xmlns:a16="http://schemas.microsoft.com/office/drawing/2014/main" id="{A3284F5E-4BDF-6730-BDC5-2E8F27C3B876}"/>
+              </a:ext>
+            </a:extLst>
+          </p:cNvPr>
+          <p:cNvPicPr>
+            <a:picLocks noChangeAspect="1" noChangeArrowheads="1"/>
+          </p:cNvPicPr>
+          <p:nvPr/>
+        </p:nvPicPr>
+        <p:blipFill>
+          <a:blip r:embed="rId3">
+            <a:extLst>
+              <a:ext uri="{28A0092B-C50C-407E-A947-70E740481C1C}">
+                <a14:useLocalDpi xmlns:a14="http://schemas.microsoft.com/office/drawing/2010/main" val="0"/>
+              </a:ext>
+            </a:extLst>
+          </a:blip>
+          <a:srcRect/>
+          <a:stretch>
+            <a:fillRect/>
+          </a:stretch>
+        </p:blipFill>
+        <p:spPr bwMode="auto">
+          <a:xfrm>
+            <a:off x="1848895" y="1290304"/>
+            <a:ext cx="7837716" cy="5170882"/>
+          </a:xfrm>
+          <a:prstGeom prst="rect">
+            <a:avLst/>
+          </a:prstGeom>
+          <a:noFill/>
+          <a:extLst>
+            <a:ext uri="{909E8E84-426E-40DD-AFC4-6F175D3DCCD1}">
+              <a14:hiddenFill xmlns:a14="http://schemas.microsoft.com/office/drawing/2010/main">
+                <a:solidFill>
+                  <a:srgbClr val="FFFFFF"/>
+                </a:solidFill>
+              </a14:hiddenFill>
+            </a:ext>
+          </a:extLst>
+        </p:spPr>
+      </p:pic>
+    </p:spTree>
+    <p:extLst>
+      <p:ext uri="{BB962C8B-B14F-4D97-AF65-F5344CB8AC3E}">
+        <p14:creationId xmlns:p14="http://schemas.microsoft.com/office/powerpoint/2010/main" val="1538441772"/>
+      </p:ext>
+    </p:extLst>
+  </p:cSld>
+  <p:clrMapOvr>
+    <a:masterClrMapping/>
+  </p:clrMapOvr>
+</p:sld>
+</file>
+
 <file path=ppt/slides/slide15.xml><?xml version="1.0" encoding="utf-8"?>
 <p:sld xmlns:a="http://schemas.openxmlformats.org/drawingml/2006/main" xmlns:r="http://schemas.openxmlformats.org/officeDocument/2006/relationships" xmlns:p="http://schemas.openxmlformats.org/presentationml/2006/main">
   <p:cSld>
@@ -7327,56 +7321,12 @@
           <a:chExt cx="0" cy="0"/>
         </a:xfrm>
       </p:grpSpPr>
-      <p:sp>
-        <p:nvSpPr>
-          <p:cNvPr id="2" name="Title 1">
-            <a:extLst>
-              <a:ext uri="{FF2B5EF4-FFF2-40B4-BE49-F238E27FC236}">
-                <a16:creationId xmlns:a16="http://schemas.microsoft.com/office/drawing/2014/main" id="{58A0D026-A688-D81C-FEEB-C5D9743EEA48}"/>
-              </a:ext>
-            </a:extLst>
-          </p:cNvPr>
-          <p:cNvSpPr>
-            <a:spLocks noGrp="1"/>
-          </p:cNvSpPr>
-          <p:nvPr>
-            <p:ph type="title"/>
-          </p:nvPr>
-        </p:nvSpPr>
-        <p:spPr>
-          <a:xfrm>
-            <a:off x="838200" y="113917"/>
-            <a:ext cx="10515600" cy="720097"/>
-          </a:xfrm>
-        </p:spPr>
-        <p:txBody>
-          <a:bodyPr>
-            <a:normAutofit/>
-          </a:bodyPr>
-          <a:lstStyle/>
-          <a:p>
-            <a:r>
-              <a:rPr lang="en-US" sz="4000" dirty="0" err="1">
-                <a:hlinkClick r:id="rId2"/>
-              </a:rPr>
-              <a:t>Magentic</a:t>
-            </a:r>
-            <a:r>
-              <a:rPr lang="en-US" sz="4000" dirty="0">
-                <a:hlinkClick r:id="rId2"/>
-              </a:rPr>
-              <a:t> Agent Orchestration | Microsoft Learn</a:t>
-            </a:r>
-            <a:endParaRPr lang="en-US" sz="4000" dirty="0"/>
-          </a:p>
-        </p:txBody>
-      </p:sp>
       <p:pic>
         <p:nvPicPr>
-          <p:cNvPr id="13314" name="Picture 2" descr="diagram">
-            <a:extLst>
-              <a:ext uri="{FF2B5EF4-FFF2-40B4-BE49-F238E27FC236}">
-                <a16:creationId xmlns:a16="http://schemas.microsoft.com/office/drawing/2014/main" id="{A3284F5E-4BDF-6730-BDC5-2E8F27C3B876}"/>
+          <p:cNvPr id="1026" name="Picture 2">
+            <a:extLst>
+              <a:ext uri="{FF2B5EF4-FFF2-40B4-BE49-F238E27FC236}">
+                <a16:creationId xmlns:a16="http://schemas.microsoft.com/office/drawing/2014/main" id="{FA6FCBB2-0561-BAFA-C56C-7E3064D972AA}"/>
               </a:ext>
             </a:extLst>
           </p:cNvPr>
@@ -7386,7 +7336,7 @@
           <p:nvPr/>
         </p:nvPicPr>
         <p:blipFill>
-          <a:blip r:embed="rId3">
+          <a:blip r:embed="rId2">
             <a:extLst>
               <a:ext uri="{28A0092B-C50C-407E-A947-70E740481C1C}">
                 <a14:useLocalDpi xmlns:a14="http://schemas.microsoft.com/office/drawing/2010/main" val="0"/>
@@ -7400,8 +7350,8 @@
         </p:blipFill>
         <p:spPr bwMode="auto">
           <a:xfrm>
-            <a:off x="1848895" y="1290304"/>
-            <a:ext cx="7837716" cy="5170882"/>
+            <a:off x="598488" y="0"/>
+            <a:ext cx="10993437" cy="6858000"/>
           </a:xfrm>
           <a:prstGeom prst="rect">
             <a:avLst/>
@@ -7421,7 +7371,7 @@
     </p:spTree>
     <p:extLst>
       <p:ext uri="{BB962C8B-B14F-4D97-AF65-F5344CB8AC3E}">
-        <p14:creationId xmlns:p14="http://schemas.microsoft.com/office/powerpoint/2010/main" val="1538441772"/>
+        <p14:creationId xmlns:p14="http://schemas.microsoft.com/office/powerpoint/2010/main" val="1454014955"/>
       </p:ext>
     </p:extLst>
   </p:cSld>
@@ -7448,12 +7398,62 @@
           <a:chExt cx="0" cy="0"/>
         </a:xfrm>
       </p:grpSpPr>
+      <p:sp>
+        <p:nvSpPr>
+          <p:cNvPr id="2" name="Title 1">
+            <a:extLst>
+              <a:ext uri="{FF2B5EF4-FFF2-40B4-BE49-F238E27FC236}">
+                <a16:creationId xmlns:a16="http://schemas.microsoft.com/office/drawing/2014/main" id="{A3CE7ABE-E6C5-3332-DE22-77BCF74BA35A}"/>
+              </a:ext>
+            </a:extLst>
+          </p:cNvPr>
+          <p:cNvSpPr>
+            <a:spLocks noGrp="1"/>
+          </p:cNvSpPr>
+          <p:nvPr>
+            <p:ph type="title"/>
+          </p:nvPr>
+        </p:nvSpPr>
+        <p:spPr/>
+        <p:txBody>
+          <a:bodyPr/>
+          <a:lstStyle/>
+          <a:p>
+            <a:endParaRPr lang="en-US"/>
+          </a:p>
+        </p:txBody>
+      </p:sp>
+      <p:sp>
+        <p:nvSpPr>
+          <p:cNvPr id="3" name="Content Placeholder 2">
+            <a:extLst>
+              <a:ext uri="{FF2B5EF4-FFF2-40B4-BE49-F238E27FC236}">
+                <a16:creationId xmlns:a16="http://schemas.microsoft.com/office/drawing/2014/main" id="{BD9231BE-EAF1-E5DC-1519-4F0BE34FC08A}"/>
+              </a:ext>
+            </a:extLst>
+          </p:cNvPr>
+          <p:cNvSpPr>
+            <a:spLocks noGrp="1"/>
+          </p:cNvSpPr>
+          <p:nvPr>
+            <p:ph idx="1"/>
+          </p:nvPr>
+        </p:nvSpPr>
+        <p:spPr/>
+        <p:txBody>
+          <a:bodyPr/>
+          <a:lstStyle/>
+          <a:p>
+            <a:endParaRPr lang="en-US"/>
+          </a:p>
+        </p:txBody>
+      </p:sp>
       <p:pic>
         <p:nvPicPr>
-          <p:cNvPr id="1026" name="Picture 2">
-            <a:extLst>
-              <a:ext uri="{FF2B5EF4-FFF2-40B4-BE49-F238E27FC236}">
-                <a16:creationId xmlns:a16="http://schemas.microsoft.com/office/drawing/2014/main" id="{FA6FCBB2-0561-BAFA-C56C-7E3064D972AA}"/>
+          <p:cNvPr id="2050" name="Picture 2" descr="Multi-Agent Orchestration Redefined with Microsoft Semantic Kernel">
+            <a:extLst>
+              <a:ext uri="{FF2B5EF4-FFF2-40B4-BE49-F238E27FC236}">
+                <a16:creationId xmlns:a16="http://schemas.microsoft.com/office/drawing/2014/main" id="{62BDCF7E-B0E7-6ABB-990A-25580F0DB367}"/>
               </a:ext>
             </a:extLst>
           </p:cNvPr>
@@ -7477,8 +7477,8 @@
         </p:blipFill>
         <p:spPr bwMode="auto">
           <a:xfrm>
-            <a:off x="598488" y="0"/>
-            <a:ext cx="10993437" cy="6858000"/>
+            <a:off x="0" y="0"/>
+            <a:ext cx="12192000" cy="6858000"/>
           </a:xfrm>
           <a:prstGeom prst="rect">
             <a:avLst/>
@@ -7498,7 +7498,7 @@
     </p:spTree>
     <p:extLst>
       <p:ext uri="{BB962C8B-B14F-4D97-AF65-F5344CB8AC3E}">
-        <p14:creationId xmlns:p14="http://schemas.microsoft.com/office/powerpoint/2010/main" val="1454014955"/>
+        <p14:creationId xmlns:p14="http://schemas.microsoft.com/office/powerpoint/2010/main" val="3147595132"/>
       </p:ext>
     </p:extLst>
   </p:cSld>
@@ -7530,7 +7530,7 @@
           <p:cNvPr id="2" name="Title 1">
             <a:extLst>
               <a:ext uri="{FF2B5EF4-FFF2-40B4-BE49-F238E27FC236}">
-                <a16:creationId xmlns:a16="http://schemas.microsoft.com/office/drawing/2014/main" id="{A3CE7ABE-E6C5-3332-DE22-77BCF74BA35A}"/>
+                <a16:creationId xmlns:a16="http://schemas.microsoft.com/office/drawing/2014/main" id="{2840EF99-E81B-37C8-D9A5-26D33508A82B}"/>
               </a:ext>
             </a:extLst>
           </p:cNvPr>
@@ -7555,7 +7555,7 @@
           <p:cNvPr id="3" name="Content Placeholder 2">
             <a:extLst>
               <a:ext uri="{FF2B5EF4-FFF2-40B4-BE49-F238E27FC236}">
-                <a16:creationId xmlns:a16="http://schemas.microsoft.com/office/drawing/2014/main" id="{BD9231BE-EAF1-E5DC-1519-4F0BE34FC08A}"/>
+                <a16:creationId xmlns:a16="http://schemas.microsoft.com/office/drawing/2014/main" id="{17BAAD0C-818B-EAFD-633D-8A996782D0C2}"/>
               </a:ext>
             </a:extLst>
           </p:cNvPr>
@@ -7577,10 +7577,10 @@
       </p:sp>
       <p:pic>
         <p:nvPicPr>
-          <p:cNvPr id="2050" name="Picture 2" descr="Multi-Agent Orchestration Redefined with Microsoft Semantic Kernel">
-            <a:extLst>
-              <a:ext uri="{FF2B5EF4-FFF2-40B4-BE49-F238E27FC236}">
-                <a16:creationId xmlns:a16="http://schemas.microsoft.com/office/drawing/2014/main" id="{62BDCF7E-B0E7-6ABB-990A-25580F0DB367}"/>
+          <p:cNvPr id="3074" name="Picture 2" descr="Architecting AI Apps with Semantic Kernel | Semantic Kernel">
+            <a:extLst>
+              <a:ext uri="{FF2B5EF4-FFF2-40B4-BE49-F238E27FC236}">
+                <a16:creationId xmlns:a16="http://schemas.microsoft.com/office/drawing/2014/main" id="{1A86B059-0221-CD40-5E80-817A897898B7}"/>
               </a:ext>
             </a:extLst>
           </p:cNvPr>
@@ -7604,8 +7604,8 @@
         </p:blipFill>
         <p:spPr bwMode="auto">
           <a:xfrm>
-            <a:off x="0" y="0"/>
-            <a:ext cx="12192000" cy="6858000"/>
+            <a:off x="4257675" y="0"/>
+            <a:ext cx="3676650" cy="6858000"/>
           </a:xfrm>
           <a:prstGeom prst="rect">
             <a:avLst/>
@@ -7625,7 +7625,7 @@
     </p:spTree>
     <p:extLst>
       <p:ext uri="{BB962C8B-B14F-4D97-AF65-F5344CB8AC3E}">
-        <p14:creationId xmlns:p14="http://schemas.microsoft.com/office/powerpoint/2010/main" val="3147595132"/>
+        <p14:creationId xmlns:p14="http://schemas.microsoft.com/office/powerpoint/2010/main" val="2718559222"/>
       </p:ext>
     </p:extLst>
   </p:cSld>
@@ -7652,62 +7652,12 @@
           <a:chExt cx="0" cy="0"/>
         </a:xfrm>
       </p:grpSpPr>
-      <p:sp>
-        <p:nvSpPr>
-          <p:cNvPr id="2" name="Title 1">
-            <a:extLst>
-              <a:ext uri="{FF2B5EF4-FFF2-40B4-BE49-F238E27FC236}">
-                <a16:creationId xmlns:a16="http://schemas.microsoft.com/office/drawing/2014/main" id="{2840EF99-E81B-37C8-D9A5-26D33508A82B}"/>
-              </a:ext>
-            </a:extLst>
-          </p:cNvPr>
-          <p:cNvSpPr>
-            <a:spLocks noGrp="1"/>
-          </p:cNvSpPr>
-          <p:nvPr>
-            <p:ph type="title"/>
-          </p:nvPr>
-        </p:nvSpPr>
-        <p:spPr/>
-        <p:txBody>
-          <a:bodyPr/>
-          <a:lstStyle/>
-          <a:p>
-            <a:endParaRPr lang="en-US"/>
-          </a:p>
-        </p:txBody>
-      </p:sp>
-      <p:sp>
-        <p:nvSpPr>
-          <p:cNvPr id="3" name="Content Placeholder 2">
-            <a:extLst>
-              <a:ext uri="{FF2B5EF4-FFF2-40B4-BE49-F238E27FC236}">
-                <a16:creationId xmlns:a16="http://schemas.microsoft.com/office/drawing/2014/main" id="{17BAAD0C-818B-EAFD-633D-8A996782D0C2}"/>
-              </a:ext>
-            </a:extLst>
-          </p:cNvPr>
-          <p:cNvSpPr>
-            <a:spLocks noGrp="1"/>
-          </p:cNvSpPr>
-          <p:nvPr>
-            <p:ph idx="1"/>
-          </p:nvPr>
-        </p:nvSpPr>
-        <p:spPr/>
-        <p:txBody>
-          <a:bodyPr/>
-          <a:lstStyle/>
-          <a:p>
-            <a:endParaRPr lang="en-US"/>
-          </a:p>
-        </p:txBody>
-      </p:sp>
       <p:pic>
         <p:nvPicPr>
-          <p:cNvPr id="3074" name="Picture 2" descr="Architecting AI Apps with Semantic Kernel | Semantic Kernel">
-            <a:extLst>
-              <a:ext uri="{FF2B5EF4-FFF2-40B4-BE49-F238E27FC236}">
-                <a16:creationId xmlns:a16="http://schemas.microsoft.com/office/drawing/2014/main" id="{1A86B059-0221-CD40-5E80-817A897898B7}"/>
+          <p:cNvPr id="4098" name="Picture 2" descr="Step by Step guide to develop AI Multi-Agent system using Microsoft ...">
+            <a:extLst>
+              <a:ext uri="{FF2B5EF4-FFF2-40B4-BE49-F238E27FC236}">
+                <a16:creationId xmlns:a16="http://schemas.microsoft.com/office/drawing/2014/main" id="{92F88481-283D-76AA-4525-4EB9F3DF832D}"/>
               </a:ext>
             </a:extLst>
           </p:cNvPr>
@@ -7731,8 +7681,8 @@
         </p:blipFill>
         <p:spPr bwMode="auto">
           <a:xfrm>
-            <a:off x="4257675" y="0"/>
-            <a:ext cx="3676650" cy="6858000"/>
+            <a:off x="2827338" y="0"/>
+            <a:ext cx="6537325" cy="6858000"/>
           </a:xfrm>
           <a:prstGeom prst="rect">
             <a:avLst/>
@@ -7752,7 +7702,7 @@
     </p:spTree>
     <p:extLst>
       <p:ext uri="{BB962C8B-B14F-4D97-AF65-F5344CB8AC3E}">
-        <p14:creationId xmlns:p14="http://schemas.microsoft.com/office/powerpoint/2010/main" val="2718559222"/>
+        <p14:creationId xmlns:p14="http://schemas.microsoft.com/office/powerpoint/2010/main" val="545852070"/>
       </p:ext>
     </p:extLst>
   </p:cSld>
@@ -7779,12 +7729,62 @@
           <a:chExt cx="0" cy="0"/>
         </a:xfrm>
       </p:grpSpPr>
+      <p:sp>
+        <p:nvSpPr>
+          <p:cNvPr id="2" name="Title 1">
+            <a:extLst>
+              <a:ext uri="{FF2B5EF4-FFF2-40B4-BE49-F238E27FC236}">
+                <a16:creationId xmlns:a16="http://schemas.microsoft.com/office/drawing/2014/main" id="{E924738B-6B9D-E5CC-87F5-0D823F8D2B35}"/>
+              </a:ext>
+            </a:extLst>
+          </p:cNvPr>
+          <p:cNvSpPr>
+            <a:spLocks noGrp="1"/>
+          </p:cNvSpPr>
+          <p:nvPr>
+            <p:ph type="title"/>
+          </p:nvPr>
+        </p:nvSpPr>
+        <p:spPr/>
+        <p:txBody>
+          <a:bodyPr/>
+          <a:lstStyle/>
+          <a:p>
+            <a:endParaRPr lang="en-US"/>
+          </a:p>
+        </p:txBody>
+      </p:sp>
+      <p:sp>
+        <p:nvSpPr>
+          <p:cNvPr id="3" name="Content Placeholder 2">
+            <a:extLst>
+              <a:ext uri="{FF2B5EF4-FFF2-40B4-BE49-F238E27FC236}">
+                <a16:creationId xmlns:a16="http://schemas.microsoft.com/office/drawing/2014/main" id="{AD2EB94E-87FE-7DDC-0C09-F9FC49BEB1D0}"/>
+              </a:ext>
+            </a:extLst>
+          </p:cNvPr>
+          <p:cNvSpPr>
+            <a:spLocks noGrp="1"/>
+          </p:cNvSpPr>
+          <p:nvPr>
+            <p:ph idx="1"/>
+          </p:nvPr>
+        </p:nvSpPr>
+        <p:spPr/>
+        <p:txBody>
+          <a:bodyPr/>
+          <a:lstStyle/>
+          <a:p>
+            <a:endParaRPr lang="en-US"/>
+          </a:p>
+        </p:txBody>
+      </p:sp>
       <p:pic>
         <p:nvPicPr>
-          <p:cNvPr id="4098" name="Picture 2" descr="Step by Step guide to develop AI Multi-Agent system using Microsoft ...">
-            <a:extLst>
-              <a:ext uri="{FF2B5EF4-FFF2-40B4-BE49-F238E27FC236}">
-                <a16:creationId xmlns:a16="http://schemas.microsoft.com/office/drawing/2014/main" id="{92F88481-283D-76AA-4525-4EB9F3DF832D}"/>
+          <p:cNvPr id="5122" name="Picture 2" descr="Guest Blog: Revolutionizing AI Workflows: Multi-Agent Group Chat with ...">
+            <a:extLst>
+              <a:ext uri="{FF2B5EF4-FFF2-40B4-BE49-F238E27FC236}">
+                <a16:creationId xmlns:a16="http://schemas.microsoft.com/office/drawing/2014/main" id="{D3FC531A-CD38-F969-DFBB-D6A8AEE5D8D0}"/>
               </a:ext>
             </a:extLst>
           </p:cNvPr>
@@ -7808,8 +7808,8 @@
         </p:blipFill>
         <p:spPr bwMode="auto">
           <a:xfrm>
-            <a:off x="2827338" y="0"/>
-            <a:ext cx="6537325" cy="6858000"/>
+            <a:off x="1179513" y="0"/>
+            <a:ext cx="9831387" cy="6858000"/>
           </a:xfrm>
           <a:prstGeom prst="rect">
             <a:avLst/>
@@ -7829,7 +7829,7 @@
     </p:spTree>
     <p:extLst>
       <p:ext uri="{BB962C8B-B14F-4D97-AF65-F5344CB8AC3E}">
-        <p14:creationId xmlns:p14="http://schemas.microsoft.com/office/powerpoint/2010/main" val="545852070"/>
+        <p14:creationId xmlns:p14="http://schemas.microsoft.com/office/powerpoint/2010/main" val="2284051569"/>
       </p:ext>
     </p:extLst>
   </p:cSld>
@@ -10249,6 +10249,55 @@
           </a:fontRef>
         </p:style>
       </p:cxnSp>
+      <p:sp>
+        <p:nvSpPr>
+          <p:cNvPr id="3" name="TextBox 2">
+            <a:extLst>
+              <a:ext uri="{FF2B5EF4-FFF2-40B4-BE49-F238E27FC236}">
+                <a16:creationId xmlns:a16="http://schemas.microsoft.com/office/drawing/2014/main" id="{930E7A57-2037-A4D0-686F-AC7A385615A4}"/>
+              </a:ext>
+            </a:extLst>
+          </p:cNvPr>
+          <p:cNvSpPr txBox="1"/>
+          <p:nvPr/>
+        </p:nvSpPr>
+        <p:spPr>
+          <a:xfrm>
+            <a:off x="5849167" y="3748867"/>
+            <a:ext cx="795129" cy="430887"/>
+          </a:xfrm>
+          <a:prstGeom prst="rect">
+            <a:avLst/>
+          </a:prstGeom>
+          <a:noFill/>
+        </p:spPr>
+        <p:txBody>
+          <a:bodyPr wrap="square">
+            <a:spAutoFit/>
+          </a:bodyPr>
+          <a:lstStyle/>
+          <a:p>
+            <a:pPr algn="ctr"/>
+            <a:r>
+              <a:rPr lang="en-US" sz="1050" dirty="0">
+                <a:latin typeface="Segoe UI" panose="020B0502040204020203" pitchFamily="34" charset="0"/>
+                <a:cs typeface="Segoe UI" panose="020B0502040204020203" pitchFamily="34" charset="0"/>
+              </a:rPr>
+              <a:t>MCP</a:t>
+            </a:r>
+          </a:p>
+          <a:p>
+            <a:pPr algn="ctr"/>
+            <a:r>
+              <a:rPr lang="en-US" sz="1050" dirty="0">
+                <a:latin typeface="Segoe UI" panose="020B0502040204020203" pitchFamily="34" charset="0"/>
+                <a:cs typeface="Segoe UI" panose="020B0502040204020203" pitchFamily="34" charset="0"/>
+              </a:rPr>
+              <a:t>(stdio)</a:t>
+            </a:r>
+          </a:p>
+        </p:txBody>
+      </p:sp>
     </p:spTree>
     <p:extLst>
       <p:ext uri="{BB962C8B-B14F-4D97-AF65-F5344CB8AC3E}">
@@ -10279,62 +10328,12 @@
           <a:chExt cx="0" cy="0"/>
         </a:xfrm>
       </p:grpSpPr>
-      <p:sp>
-        <p:nvSpPr>
-          <p:cNvPr id="2" name="Title 1">
-            <a:extLst>
-              <a:ext uri="{FF2B5EF4-FFF2-40B4-BE49-F238E27FC236}">
-                <a16:creationId xmlns:a16="http://schemas.microsoft.com/office/drawing/2014/main" id="{E924738B-6B9D-E5CC-87F5-0D823F8D2B35}"/>
-              </a:ext>
-            </a:extLst>
-          </p:cNvPr>
-          <p:cNvSpPr>
-            <a:spLocks noGrp="1"/>
-          </p:cNvSpPr>
-          <p:nvPr>
-            <p:ph type="title"/>
-          </p:nvPr>
-        </p:nvSpPr>
-        <p:spPr/>
-        <p:txBody>
-          <a:bodyPr/>
-          <a:lstStyle/>
-          <a:p>
-            <a:endParaRPr lang="en-US"/>
-          </a:p>
-        </p:txBody>
-      </p:sp>
-      <p:sp>
-        <p:nvSpPr>
-          <p:cNvPr id="3" name="Content Placeholder 2">
-            <a:extLst>
-              <a:ext uri="{FF2B5EF4-FFF2-40B4-BE49-F238E27FC236}">
-                <a16:creationId xmlns:a16="http://schemas.microsoft.com/office/drawing/2014/main" id="{AD2EB94E-87FE-7DDC-0C09-F9FC49BEB1D0}"/>
-              </a:ext>
-            </a:extLst>
-          </p:cNvPr>
-          <p:cNvSpPr>
-            <a:spLocks noGrp="1"/>
-          </p:cNvSpPr>
-          <p:nvPr>
-            <p:ph idx="1"/>
-          </p:nvPr>
-        </p:nvSpPr>
-        <p:spPr/>
-        <p:txBody>
-          <a:bodyPr/>
-          <a:lstStyle/>
-          <a:p>
-            <a:endParaRPr lang="en-US"/>
-          </a:p>
-        </p:txBody>
-      </p:sp>
       <p:pic>
         <p:nvPicPr>
-          <p:cNvPr id="5122" name="Picture 2" descr="Guest Blog: Revolutionizing AI Workflows: Multi-Agent Group Chat with ...">
-            <a:extLst>
-              <a:ext uri="{FF2B5EF4-FFF2-40B4-BE49-F238E27FC236}">
-                <a16:creationId xmlns:a16="http://schemas.microsoft.com/office/drawing/2014/main" id="{D3FC531A-CD38-F969-DFBB-D6A8AEE5D8D0}"/>
+          <p:cNvPr id="24578" name="Picture 2">
+            <a:extLst>
+              <a:ext uri="{FF2B5EF4-FFF2-40B4-BE49-F238E27FC236}">
+                <a16:creationId xmlns:a16="http://schemas.microsoft.com/office/drawing/2014/main" id="{FEC9B5F4-429C-3B4C-BA83-4CEC3DA9C004}"/>
               </a:ext>
             </a:extLst>
           </p:cNvPr>
@@ -10358,8 +10357,8 @@
         </p:blipFill>
         <p:spPr bwMode="auto">
           <a:xfrm>
-            <a:off x="1179513" y="0"/>
-            <a:ext cx="9831387" cy="6858000"/>
+            <a:off x="419100" y="1187413"/>
+            <a:ext cx="9486206" cy="5203862"/>
           </a:xfrm>
           <a:prstGeom prst="rect">
             <a:avLst/>
@@ -10376,10 +10375,48 @@
           </a:extLst>
         </p:spPr>
       </p:pic>
+      <p:sp>
+        <p:nvSpPr>
+          <p:cNvPr id="5" name="TextBox 4">
+            <a:extLst>
+              <a:ext uri="{FF2B5EF4-FFF2-40B4-BE49-F238E27FC236}">
+                <a16:creationId xmlns:a16="http://schemas.microsoft.com/office/drawing/2014/main" id="{8EF55792-3290-1F05-C1C9-C609142257E8}"/>
+              </a:ext>
+            </a:extLst>
+          </p:cNvPr>
+          <p:cNvSpPr txBox="1"/>
+          <p:nvPr/>
+        </p:nvSpPr>
+        <p:spPr>
+          <a:xfrm>
+            <a:off x="1438275" y="362635"/>
+            <a:ext cx="6096000" cy="646331"/>
+          </a:xfrm>
+          <a:prstGeom prst="rect">
+            <a:avLst/>
+          </a:prstGeom>
+          <a:noFill/>
+        </p:spPr>
+        <p:txBody>
+          <a:bodyPr wrap="square">
+            <a:spAutoFit/>
+          </a:bodyPr>
+          <a:lstStyle/>
+          <a:p>
+            <a:r>
+              <a:rPr lang="en-US" dirty="0">
+                <a:hlinkClick r:id="rId3"/>
+              </a:rPr>
+              <a:t>AI Agent Architecture via A2A/MCP | by Jeffrey Richter | Jun, 2025 | Medium</a:t>
+            </a:r>
+            <a:endParaRPr lang="en-US" dirty="0"/>
+          </a:p>
+        </p:txBody>
+      </p:sp>
     </p:spTree>
     <p:extLst>
       <p:ext uri="{BB962C8B-B14F-4D97-AF65-F5344CB8AC3E}">
-        <p14:creationId xmlns:p14="http://schemas.microsoft.com/office/powerpoint/2010/main" val="2284051569"/>
+        <p14:creationId xmlns:p14="http://schemas.microsoft.com/office/powerpoint/2010/main" val="1771684800"/>
       </p:ext>
     </p:extLst>
   </p:cSld>
@@ -10408,10 +10445,10 @@
       </p:grpSpPr>
       <p:pic>
         <p:nvPicPr>
-          <p:cNvPr id="24578" name="Picture 2">
-            <a:extLst>
-              <a:ext uri="{FF2B5EF4-FFF2-40B4-BE49-F238E27FC236}">
-                <a16:creationId xmlns:a16="http://schemas.microsoft.com/office/drawing/2014/main" id="{FEC9B5F4-429C-3B4C-BA83-4CEC3DA9C004}"/>
+          <p:cNvPr id="27650" name="Picture 2">
+            <a:extLst>
+              <a:ext uri="{FF2B5EF4-FFF2-40B4-BE49-F238E27FC236}">
+                <a16:creationId xmlns:a16="http://schemas.microsoft.com/office/drawing/2014/main" id="{8EC28889-3EBF-0ECB-144D-4EFD654EB6DA}"/>
               </a:ext>
             </a:extLst>
           </p:cNvPr>
@@ -10435,8 +10472,8 @@
         </p:blipFill>
         <p:spPr bwMode="auto">
           <a:xfrm>
-            <a:off x="419100" y="1187413"/>
-            <a:ext cx="9486206" cy="5203862"/>
+            <a:off x="219074" y="842963"/>
+            <a:ext cx="11220039" cy="4471987"/>
           </a:xfrm>
           <a:prstGeom prst="rect">
             <a:avLst/>
@@ -10453,48 +10490,10 @@
           </a:extLst>
         </p:spPr>
       </p:pic>
-      <p:sp>
-        <p:nvSpPr>
-          <p:cNvPr id="5" name="TextBox 4">
-            <a:extLst>
-              <a:ext uri="{FF2B5EF4-FFF2-40B4-BE49-F238E27FC236}">
-                <a16:creationId xmlns:a16="http://schemas.microsoft.com/office/drawing/2014/main" id="{8EF55792-3290-1F05-C1C9-C609142257E8}"/>
-              </a:ext>
-            </a:extLst>
-          </p:cNvPr>
-          <p:cNvSpPr txBox="1"/>
-          <p:nvPr/>
-        </p:nvSpPr>
-        <p:spPr>
-          <a:xfrm>
-            <a:off x="1438275" y="362635"/>
-            <a:ext cx="6096000" cy="646331"/>
-          </a:xfrm>
-          <a:prstGeom prst="rect">
-            <a:avLst/>
-          </a:prstGeom>
-          <a:noFill/>
-        </p:spPr>
-        <p:txBody>
-          <a:bodyPr wrap="square">
-            <a:spAutoFit/>
-          </a:bodyPr>
-          <a:lstStyle/>
-          <a:p>
-            <a:r>
-              <a:rPr lang="en-US" dirty="0">
-                <a:hlinkClick r:id="rId3"/>
-              </a:rPr>
-              <a:t>AI Agent Architecture via A2A/MCP | by Jeffrey Richter | Jun, 2025 | Medium</a:t>
-            </a:r>
-            <a:endParaRPr lang="en-US" dirty="0"/>
-          </a:p>
-        </p:txBody>
-      </p:sp>
     </p:spTree>
     <p:extLst>
       <p:ext uri="{BB962C8B-B14F-4D97-AF65-F5344CB8AC3E}">
-        <p14:creationId xmlns:p14="http://schemas.microsoft.com/office/powerpoint/2010/main" val="1771684800"/>
+        <p14:creationId xmlns:p14="http://schemas.microsoft.com/office/powerpoint/2010/main" val="1226889223"/>
       </p:ext>
     </p:extLst>
   </p:cSld>
@@ -10523,10 +10522,10 @@
       </p:grpSpPr>
       <p:pic>
         <p:nvPicPr>
-          <p:cNvPr id="27650" name="Picture 2">
-            <a:extLst>
-              <a:ext uri="{FF2B5EF4-FFF2-40B4-BE49-F238E27FC236}">
-                <a16:creationId xmlns:a16="http://schemas.microsoft.com/office/drawing/2014/main" id="{8EC28889-3EBF-0ECB-144D-4EFD654EB6DA}"/>
+          <p:cNvPr id="26626" name="Picture 2">
+            <a:extLst>
+              <a:ext uri="{FF2B5EF4-FFF2-40B4-BE49-F238E27FC236}">
+                <a16:creationId xmlns:a16="http://schemas.microsoft.com/office/drawing/2014/main" id="{00F76BFD-2F4B-8962-698D-FD72962F9652}"/>
               </a:ext>
             </a:extLst>
           </p:cNvPr>
@@ -10550,8 +10549,8 @@
         </p:blipFill>
         <p:spPr bwMode="auto">
           <a:xfrm>
-            <a:off x="219074" y="842963"/>
-            <a:ext cx="11220039" cy="4471987"/>
+            <a:off x="342900" y="171450"/>
+            <a:ext cx="5943600" cy="6515100"/>
           </a:xfrm>
           <a:prstGeom prst="rect">
             <a:avLst/>
@@ -10568,83 +10567,6 @@
           </a:extLst>
         </p:spPr>
       </p:pic>
-    </p:spTree>
-    <p:extLst>
-      <p:ext uri="{BB962C8B-B14F-4D97-AF65-F5344CB8AC3E}">
-        <p14:creationId xmlns:p14="http://schemas.microsoft.com/office/powerpoint/2010/main" val="1226889223"/>
-      </p:ext>
-    </p:extLst>
-  </p:cSld>
-  <p:clrMapOvr>
-    <a:masterClrMapping/>
-  </p:clrMapOvr>
-</p:sld>
-</file>
-
-<file path=ppt/slides/slide23.xml><?xml version="1.0" encoding="utf-8"?>
-<p:sld xmlns:a="http://schemas.openxmlformats.org/drawingml/2006/main" xmlns:r="http://schemas.openxmlformats.org/officeDocument/2006/relationships" xmlns:p="http://schemas.openxmlformats.org/presentationml/2006/main">
-  <p:cSld>
-    <p:spTree>
-      <p:nvGrpSpPr>
-        <p:cNvPr id="1" name=""/>
-        <p:cNvGrpSpPr/>
-        <p:nvPr/>
-      </p:nvGrpSpPr>
-      <p:grpSpPr>
-        <a:xfrm>
-          <a:off x="0" y="0"/>
-          <a:ext cx="0" cy="0"/>
-          <a:chOff x="0" y="0"/>
-          <a:chExt cx="0" cy="0"/>
-        </a:xfrm>
-      </p:grpSpPr>
-      <p:pic>
-        <p:nvPicPr>
-          <p:cNvPr id="26626" name="Picture 2">
-            <a:extLst>
-              <a:ext uri="{FF2B5EF4-FFF2-40B4-BE49-F238E27FC236}">
-                <a16:creationId xmlns:a16="http://schemas.microsoft.com/office/drawing/2014/main" id="{00F76BFD-2F4B-8962-698D-FD72962F9652}"/>
-              </a:ext>
-            </a:extLst>
-          </p:cNvPr>
-          <p:cNvPicPr>
-            <a:picLocks noChangeAspect="1" noChangeArrowheads="1"/>
-          </p:cNvPicPr>
-          <p:nvPr/>
-        </p:nvPicPr>
-        <p:blipFill>
-          <a:blip r:embed="rId2">
-            <a:extLst>
-              <a:ext uri="{28A0092B-C50C-407E-A947-70E740481C1C}">
-                <a14:useLocalDpi xmlns:a14="http://schemas.microsoft.com/office/drawing/2010/main" val="0"/>
-              </a:ext>
-            </a:extLst>
-          </a:blip>
-          <a:srcRect/>
-          <a:stretch>
-            <a:fillRect/>
-          </a:stretch>
-        </p:blipFill>
-        <p:spPr bwMode="auto">
-          <a:xfrm>
-            <a:off x="342900" y="171450"/>
-            <a:ext cx="5943600" cy="6515100"/>
-          </a:xfrm>
-          <a:prstGeom prst="rect">
-            <a:avLst/>
-          </a:prstGeom>
-          <a:noFill/>
-          <a:extLst>
-            <a:ext uri="{909E8E84-426E-40DD-AFC4-6F175D3DCCD1}">
-              <a14:hiddenFill xmlns:a14="http://schemas.microsoft.com/office/drawing/2010/main">
-                <a:solidFill>
-                  <a:srgbClr val="FFFFFF"/>
-                </a:solidFill>
-              </a14:hiddenFill>
-            </a:ext>
-          </a:extLst>
-        </p:spPr>
-      </p:pic>
       <p:sp>
         <p:nvSpPr>
           <p:cNvPr id="4" name="TextBox 3">
@@ -10696,7 +10618,7 @@
 </p:sld>
 </file>
 
-<file path=ppt/slides/slide3.xml><?xml version="1.0" encoding="utf-8"?>
+<file path=ppt/slides/slide23.xml><?xml version="1.0" encoding="utf-8"?>
 <p:sld xmlns:a="http://schemas.openxmlformats.org/drawingml/2006/main" xmlns:r="http://schemas.openxmlformats.org/officeDocument/2006/relationships" xmlns:p="http://schemas.openxmlformats.org/presentationml/2006/main">
   <p:cSld>
     <p:spTree>
@@ -11051,8 +10973,37 @@
               <a:bodyPr rtlCol="0" anchor="ctr"/>
               <a:lstStyle/>
               <a:p>
-                <a:pPr algn="ctr"/>
-                <a:endParaRPr lang="en-US" dirty="0"/>
+                <a:pPr marL="0" marR="0" lvl="0" indent="0" algn="ctr" defTabSz="914400" rtl="0" eaLnBrk="1" fontAlgn="auto" latinLnBrk="0" hangingPunct="1">
+                  <a:lnSpc>
+                    <a:spcPct val="100000"/>
+                  </a:lnSpc>
+                  <a:spcBef>
+                    <a:spcPts val="0"/>
+                  </a:spcBef>
+                  <a:spcAft>
+                    <a:spcPts val="0"/>
+                  </a:spcAft>
+                  <a:buClrTx/>
+                  <a:buSzTx/>
+                  <a:buFontTx/>
+                  <a:buNone/>
+                  <a:tabLst/>
+                  <a:defRPr/>
+                </a:pPr>
+                <a:endParaRPr kumimoji="0" lang="en-US" sz="1800" b="0" i="0" u="none" strike="noStrike" kern="1200" cap="none" spc="0" normalizeH="0" baseline="0" noProof="0" dirty="0">
+                  <a:ln>
+                    <a:noFill/>
+                  </a:ln>
+                  <a:solidFill>
+                    <a:prstClr val="white"/>
+                  </a:solidFill>
+                  <a:effectLst/>
+                  <a:uLnTx/>
+                  <a:uFillTx/>
+                  <a:latin typeface="Aptos" panose="02110004020202020204"/>
+                  <a:ea typeface="+mn-ea"/>
+                  <a:cs typeface="+mn-cs"/>
+                </a:endParaRPr>
               </a:p>
             </p:txBody>
           </p:sp>
@@ -11103,8 +11054,37 @@
               <a:bodyPr rtlCol="0" anchor="ctr"/>
               <a:lstStyle/>
               <a:p>
-                <a:pPr algn="ctr"/>
-                <a:endParaRPr lang="en-US"/>
+                <a:pPr marL="0" marR="0" lvl="0" indent="0" algn="ctr" defTabSz="914400" rtl="0" eaLnBrk="1" fontAlgn="auto" latinLnBrk="0" hangingPunct="1">
+                  <a:lnSpc>
+                    <a:spcPct val="100000"/>
+                  </a:lnSpc>
+                  <a:spcBef>
+                    <a:spcPts val="0"/>
+                  </a:spcBef>
+                  <a:spcAft>
+                    <a:spcPts val="0"/>
+                  </a:spcAft>
+                  <a:buClrTx/>
+                  <a:buSzTx/>
+                  <a:buFontTx/>
+                  <a:buNone/>
+                  <a:tabLst/>
+                  <a:defRPr/>
+                </a:pPr>
+                <a:endParaRPr kumimoji="0" lang="en-US" sz="1800" b="0" i="0" u="none" strike="noStrike" kern="1200" cap="none" spc="0" normalizeH="0" baseline="0" noProof="0">
+                  <a:ln>
+                    <a:noFill/>
+                  </a:ln>
+                  <a:solidFill>
+                    <a:prstClr val="white"/>
+                  </a:solidFill>
+                  <a:effectLst/>
+                  <a:uLnTx/>
+                  <a:uFillTx/>
+                  <a:latin typeface="Aptos" panose="02110004020202020204"/>
+                  <a:ea typeface="+mn-ea"/>
+                  <a:cs typeface="+mn-cs"/>
+                </a:endParaRPr>
               </a:p>
             </p:txBody>
           </p:sp>
@@ -11155,8 +11135,37 @@
               <a:bodyPr rtlCol="0" anchor="ctr"/>
               <a:lstStyle/>
               <a:p>
-                <a:pPr algn="ctr"/>
-                <a:endParaRPr lang="en-US"/>
+                <a:pPr marL="0" marR="0" lvl="0" indent="0" algn="ctr" defTabSz="914400" rtl="0" eaLnBrk="1" fontAlgn="auto" latinLnBrk="0" hangingPunct="1">
+                  <a:lnSpc>
+                    <a:spcPct val="100000"/>
+                  </a:lnSpc>
+                  <a:spcBef>
+                    <a:spcPts val="0"/>
+                  </a:spcBef>
+                  <a:spcAft>
+                    <a:spcPts val="0"/>
+                  </a:spcAft>
+                  <a:buClrTx/>
+                  <a:buSzTx/>
+                  <a:buFontTx/>
+                  <a:buNone/>
+                  <a:tabLst/>
+                  <a:defRPr/>
+                </a:pPr>
+                <a:endParaRPr kumimoji="0" lang="en-US" sz="1800" b="0" i="0" u="none" strike="noStrike" kern="1200" cap="none" spc="0" normalizeH="0" baseline="0" noProof="0">
+                  <a:ln>
+                    <a:noFill/>
+                  </a:ln>
+                  <a:solidFill>
+                    <a:prstClr val="white"/>
+                  </a:solidFill>
+                  <a:effectLst/>
+                  <a:uLnTx/>
+                  <a:uFillTx/>
+                  <a:latin typeface="Aptos" panose="02110004020202020204"/>
+                  <a:ea typeface="+mn-ea"/>
+                  <a:cs typeface="+mn-cs"/>
+                </a:endParaRPr>
               </a:p>
             </p:txBody>
           </p:sp>
@@ -11238,8 +11247,37 @@
               <a:bodyPr rtlCol="0" anchor="ctr"/>
               <a:lstStyle/>
               <a:p>
-                <a:pPr algn="ctr"/>
-                <a:endParaRPr lang="en-US" dirty="0"/>
+                <a:pPr marL="0" marR="0" lvl="0" indent="0" algn="ctr" defTabSz="914400" rtl="0" eaLnBrk="1" fontAlgn="auto" latinLnBrk="0" hangingPunct="1">
+                  <a:lnSpc>
+                    <a:spcPct val="100000"/>
+                  </a:lnSpc>
+                  <a:spcBef>
+                    <a:spcPts val="0"/>
+                  </a:spcBef>
+                  <a:spcAft>
+                    <a:spcPts val="0"/>
+                  </a:spcAft>
+                  <a:buClrTx/>
+                  <a:buSzTx/>
+                  <a:buFontTx/>
+                  <a:buNone/>
+                  <a:tabLst/>
+                  <a:defRPr/>
+                </a:pPr>
+                <a:endParaRPr kumimoji="0" lang="en-US" sz="1800" b="0" i="0" u="none" strike="noStrike" kern="1200" cap="none" spc="0" normalizeH="0" baseline="0" noProof="0" dirty="0">
+                  <a:ln>
+                    <a:noFill/>
+                  </a:ln>
+                  <a:solidFill>
+                    <a:prstClr val="white"/>
+                  </a:solidFill>
+                  <a:effectLst/>
+                  <a:uLnTx/>
+                  <a:uFillTx/>
+                  <a:latin typeface="Aptos" panose="02110004020202020204"/>
+                  <a:ea typeface="+mn-ea"/>
+                  <a:cs typeface="+mn-cs"/>
+                </a:endParaRPr>
               </a:p>
             </p:txBody>
           </p:sp>
@@ -11374,8 +11412,37 @@
               <a:bodyPr rtlCol="0" anchor="ctr"/>
               <a:lstStyle/>
               <a:p>
-                <a:pPr algn="ctr"/>
-                <a:endParaRPr lang="en-US"/>
+                <a:pPr marL="0" marR="0" lvl="0" indent="0" algn="ctr" defTabSz="914400" rtl="0" eaLnBrk="1" fontAlgn="auto" latinLnBrk="0" hangingPunct="1">
+                  <a:lnSpc>
+                    <a:spcPct val="100000"/>
+                  </a:lnSpc>
+                  <a:spcBef>
+                    <a:spcPts val="0"/>
+                  </a:spcBef>
+                  <a:spcAft>
+                    <a:spcPts val="0"/>
+                  </a:spcAft>
+                  <a:buClrTx/>
+                  <a:buSzTx/>
+                  <a:buFontTx/>
+                  <a:buNone/>
+                  <a:tabLst/>
+                  <a:defRPr/>
+                </a:pPr>
+                <a:endParaRPr kumimoji="0" lang="en-US" sz="1800" b="0" i="0" u="none" strike="noStrike" kern="1200" cap="none" spc="0" normalizeH="0" baseline="0" noProof="0">
+                  <a:ln>
+                    <a:noFill/>
+                  </a:ln>
+                  <a:solidFill>
+                    <a:prstClr val="black"/>
+                  </a:solidFill>
+                  <a:effectLst/>
+                  <a:uLnTx/>
+                  <a:uFillTx/>
+                  <a:latin typeface="Aptos" panose="02110004020202020204"/>
+                  <a:ea typeface="+mn-ea"/>
+                  <a:cs typeface="+mn-cs"/>
+                </a:endParaRPr>
               </a:p>
             </p:txBody>
           </p:sp>
@@ -11457,8 +11524,37 @@
               <a:bodyPr rtlCol="0" anchor="ctr"/>
               <a:lstStyle/>
               <a:p>
-                <a:pPr algn="ctr"/>
-                <a:endParaRPr lang="en-US"/>
+                <a:pPr marL="0" marR="0" lvl="0" indent="0" algn="ctr" defTabSz="914400" rtl="0" eaLnBrk="1" fontAlgn="auto" latinLnBrk="0" hangingPunct="1">
+                  <a:lnSpc>
+                    <a:spcPct val="100000"/>
+                  </a:lnSpc>
+                  <a:spcBef>
+                    <a:spcPts val="0"/>
+                  </a:spcBef>
+                  <a:spcAft>
+                    <a:spcPts val="0"/>
+                  </a:spcAft>
+                  <a:buClrTx/>
+                  <a:buSzTx/>
+                  <a:buFontTx/>
+                  <a:buNone/>
+                  <a:tabLst/>
+                  <a:defRPr/>
+                </a:pPr>
+                <a:endParaRPr kumimoji="0" lang="en-US" sz="1800" b="0" i="0" u="none" strike="noStrike" kern="1200" cap="none" spc="0" normalizeH="0" baseline="0" noProof="0">
+                  <a:ln>
+                    <a:noFill/>
+                  </a:ln>
+                  <a:solidFill>
+                    <a:prstClr val="white"/>
+                  </a:solidFill>
+                  <a:effectLst/>
+                  <a:uLnTx/>
+                  <a:uFillTx/>
+                  <a:latin typeface="Aptos" panose="02110004020202020204"/>
+                  <a:ea typeface="+mn-ea"/>
+                  <a:cs typeface="+mn-cs"/>
+                </a:endParaRPr>
               </a:p>
             </p:txBody>
           </p:sp>
@@ -11754,8 +11850,37 @@
             <a:bodyPr rtlCol="0" anchor="ctr"/>
             <a:lstStyle/>
             <a:p>
-              <a:pPr algn="ctr"/>
-              <a:endParaRPr lang="en-US" dirty="0"/>
+              <a:pPr marL="0" marR="0" lvl="0" indent="0" algn="ctr" defTabSz="914400" rtl="0" eaLnBrk="1" fontAlgn="auto" latinLnBrk="0" hangingPunct="1">
+                <a:lnSpc>
+                  <a:spcPct val="100000"/>
+                </a:lnSpc>
+                <a:spcBef>
+                  <a:spcPts val="0"/>
+                </a:spcBef>
+                <a:spcAft>
+                  <a:spcPts val="0"/>
+                </a:spcAft>
+                <a:buClrTx/>
+                <a:buSzTx/>
+                <a:buFontTx/>
+                <a:buNone/>
+                <a:tabLst/>
+                <a:defRPr/>
+              </a:pPr>
+              <a:endParaRPr kumimoji="0" lang="en-US" sz="1800" b="0" i="0" u="none" strike="noStrike" kern="1200" cap="none" spc="0" normalizeH="0" baseline="0" noProof="0" dirty="0">
+                <a:ln>
+                  <a:noFill/>
+                </a:ln>
+                <a:solidFill>
+                  <a:prstClr val="white"/>
+                </a:solidFill>
+                <a:effectLst/>
+                <a:uLnTx/>
+                <a:uFillTx/>
+                <a:latin typeface="Aptos" panose="02110004020202020204"/>
+                <a:ea typeface="+mn-ea"/>
+                <a:cs typeface="+mn-cs"/>
+              </a:endParaRPr>
             </a:p>
           </p:txBody>
         </p:sp>
@@ -11806,8 +11931,37 @@
             <a:bodyPr rtlCol="0" anchor="ctr"/>
             <a:lstStyle/>
             <a:p>
-              <a:pPr algn="ctr"/>
-              <a:endParaRPr lang="en-US"/>
+              <a:pPr marL="0" marR="0" lvl="0" indent="0" algn="ctr" defTabSz="914400" rtl="0" eaLnBrk="1" fontAlgn="auto" latinLnBrk="0" hangingPunct="1">
+                <a:lnSpc>
+                  <a:spcPct val="100000"/>
+                </a:lnSpc>
+                <a:spcBef>
+                  <a:spcPts val="0"/>
+                </a:spcBef>
+                <a:spcAft>
+                  <a:spcPts val="0"/>
+                </a:spcAft>
+                <a:buClrTx/>
+                <a:buSzTx/>
+                <a:buFontTx/>
+                <a:buNone/>
+                <a:tabLst/>
+                <a:defRPr/>
+              </a:pPr>
+              <a:endParaRPr kumimoji="0" lang="en-US" sz="1800" b="0" i="0" u="none" strike="noStrike" kern="1200" cap="none" spc="0" normalizeH="0" baseline="0" noProof="0">
+                <a:ln>
+                  <a:noFill/>
+                </a:ln>
+                <a:solidFill>
+                  <a:prstClr val="white"/>
+                </a:solidFill>
+                <a:effectLst/>
+                <a:uLnTx/>
+                <a:uFillTx/>
+                <a:latin typeface="Aptos" panose="02110004020202020204"/>
+                <a:ea typeface="+mn-ea"/>
+                <a:cs typeface="+mn-cs"/>
+              </a:endParaRPr>
             </a:p>
           </p:txBody>
         </p:sp>
@@ -11858,8 +12012,37 @@
             <a:bodyPr rtlCol="0" anchor="ctr"/>
             <a:lstStyle/>
             <a:p>
-              <a:pPr algn="ctr"/>
-              <a:endParaRPr lang="en-US"/>
+              <a:pPr marL="0" marR="0" lvl="0" indent="0" algn="ctr" defTabSz="914400" rtl="0" eaLnBrk="1" fontAlgn="auto" latinLnBrk="0" hangingPunct="1">
+                <a:lnSpc>
+                  <a:spcPct val="100000"/>
+                </a:lnSpc>
+                <a:spcBef>
+                  <a:spcPts val="0"/>
+                </a:spcBef>
+                <a:spcAft>
+                  <a:spcPts val="0"/>
+                </a:spcAft>
+                <a:buClrTx/>
+                <a:buSzTx/>
+                <a:buFontTx/>
+                <a:buNone/>
+                <a:tabLst/>
+                <a:defRPr/>
+              </a:pPr>
+              <a:endParaRPr kumimoji="0" lang="en-US" sz="1800" b="0" i="0" u="none" strike="noStrike" kern="1200" cap="none" spc="0" normalizeH="0" baseline="0" noProof="0">
+                <a:ln>
+                  <a:noFill/>
+                </a:ln>
+                <a:solidFill>
+                  <a:prstClr val="white"/>
+                </a:solidFill>
+                <a:effectLst/>
+                <a:uLnTx/>
+                <a:uFillTx/>
+                <a:latin typeface="Aptos" panose="02110004020202020204"/>
+                <a:ea typeface="+mn-ea"/>
+                <a:cs typeface="+mn-cs"/>
+              </a:endParaRPr>
             </a:p>
           </p:txBody>
         </p:sp>
@@ -12004,8 +12187,37 @@
             <a:bodyPr rtlCol="0" anchor="ctr"/>
             <a:lstStyle/>
             <a:p>
-              <a:pPr algn="ctr"/>
-              <a:endParaRPr lang="en-US"/>
+              <a:pPr marL="0" marR="0" lvl="0" indent="0" algn="ctr" defTabSz="914400" rtl="0" eaLnBrk="1" fontAlgn="auto" latinLnBrk="0" hangingPunct="1">
+                <a:lnSpc>
+                  <a:spcPct val="100000"/>
+                </a:lnSpc>
+                <a:spcBef>
+                  <a:spcPts val="0"/>
+                </a:spcBef>
+                <a:spcAft>
+                  <a:spcPts val="0"/>
+                </a:spcAft>
+                <a:buClrTx/>
+                <a:buSzTx/>
+                <a:buFontTx/>
+                <a:buNone/>
+                <a:tabLst/>
+                <a:defRPr/>
+              </a:pPr>
+              <a:endParaRPr kumimoji="0" lang="en-US" sz="1800" b="0" i="0" u="none" strike="noStrike" kern="1200" cap="none" spc="0" normalizeH="0" baseline="0" noProof="0">
+                <a:ln>
+                  <a:noFill/>
+                </a:ln>
+                <a:solidFill>
+                  <a:prstClr val="black"/>
+                </a:solidFill>
+                <a:effectLst/>
+                <a:uLnTx/>
+                <a:uFillTx/>
+                <a:latin typeface="Aptos" panose="02110004020202020204"/>
+                <a:ea typeface="+mn-ea"/>
+                <a:cs typeface="+mn-cs"/>
+              </a:endParaRPr>
             </a:p>
           </p:txBody>
         </p:sp>
@@ -12095,8 +12307,37 @@
             <a:bodyPr rtlCol="0" anchor="ctr"/>
             <a:lstStyle/>
             <a:p>
-              <a:pPr algn="ctr"/>
-              <a:endParaRPr lang="en-US" dirty="0"/>
+              <a:pPr marL="0" marR="0" lvl="0" indent="0" algn="ctr" defTabSz="914400" rtl="0" eaLnBrk="1" fontAlgn="auto" latinLnBrk="0" hangingPunct="1">
+                <a:lnSpc>
+                  <a:spcPct val="100000"/>
+                </a:lnSpc>
+                <a:spcBef>
+                  <a:spcPts val="0"/>
+                </a:spcBef>
+                <a:spcAft>
+                  <a:spcPts val="0"/>
+                </a:spcAft>
+                <a:buClrTx/>
+                <a:buSzTx/>
+                <a:buFontTx/>
+                <a:buNone/>
+                <a:tabLst/>
+                <a:defRPr/>
+              </a:pPr>
+              <a:endParaRPr kumimoji="0" lang="en-US" sz="1800" b="0" i="0" u="none" strike="noStrike" kern="1200" cap="none" spc="0" normalizeH="0" baseline="0" noProof="0" dirty="0">
+                <a:ln>
+                  <a:noFill/>
+                </a:ln>
+                <a:solidFill>
+                  <a:prstClr val="white"/>
+                </a:solidFill>
+                <a:effectLst/>
+                <a:uLnTx/>
+                <a:uFillTx/>
+                <a:latin typeface="Aptos" panose="02110004020202020204"/>
+                <a:ea typeface="+mn-ea"/>
+                <a:cs typeface="+mn-cs"/>
+              </a:endParaRPr>
             </a:p>
           </p:txBody>
         </p:sp>
@@ -12231,8 +12472,37 @@
           <a:bodyPr rtlCol="0" anchor="ctr"/>
           <a:lstStyle/>
           <a:p>
-            <a:pPr algn="ctr"/>
-            <a:endParaRPr lang="en-US"/>
+            <a:pPr marL="0" marR="0" lvl="0" indent="0" algn="ctr" defTabSz="914400" rtl="0" eaLnBrk="1" fontAlgn="auto" latinLnBrk="0" hangingPunct="1">
+              <a:lnSpc>
+                <a:spcPct val="100000"/>
+              </a:lnSpc>
+              <a:spcBef>
+                <a:spcPts val="0"/>
+              </a:spcBef>
+              <a:spcAft>
+                <a:spcPts val="0"/>
+              </a:spcAft>
+              <a:buClrTx/>
+              <a:buSzTx/>
+              <a:buFontTx/>
+              <a:buNone/>
+              <a:tabLst/>
+              <a:defRPr/>
+            </a:pPr>
+            <a:endParaRPr kumimoji="0" lang="en-US" sz="1800" b="0" i="0" u="none" strike="noStrike" kern="1200" cap="none" spc="0" normalizeH="0" baseline="0" noProof="0">
+              <a:ln>
+                <a:noFill/>
+              </a:ln>
+              <a:solidFill>
+                <a:prstClr val="white"/>
+              </a:solidFill>
+              <a:effectLst/>
+              <a:uLnTx/>
+              <a:uFillTx/>
+              <a:latin typeface="Aptos" panose="02110004020202020204"/>
+              <a:ea typeface="+mn-ea"/>
+              <a:cs typeface="+mn-cs"/>
+            </a:endParaRPr>
           </a:p>
         </p:txBody>
       </p:sp>
@@ -12311,30 +12581,108 @@
           </a:bodyPr>
           <a:lstStyle/>
           <a:p>
-            <a:pPr algn="ctr"/>
+            <a:pPr marL="0" marR="0" lvl="0" indent="0" algn="ctr" defTabSz="914400" rtl="0" eaLnBrk="1" fontAlgn="auto" latinLnBrk="0" hangingPunct="1">
+              <a:lnSpc>
+                <a:spcPct val="100000"/>
+              </a:lnSpc>
+              <a:spcBef>
+                <a:spcPts val="0"/>
+              </a:spcBef>
+              <a:spcAft>
+                <a:spcPts val="0"/>
+              </a:spcAft>
+              <a:buClrTx/>
+              <a:buSzTx/>
+              <a:buFontTx/>
+              <a:buNone/>
+              <a:tabLst/>
+              <a:defRPr/>
+            </a:pPr>
             <a:r>
-              <a:rPr lang="en-US" sz="900" dirty="0">
+              <a:rPr kumimoji="0" lang="en-US" sz="900" b="0" i="0" u="none" strike="noStrike" kern="1200" cap="none" spc="0" normalizeH="0" baseline="0" noProof="0" dirty="0">
+                <a:ln>
+                  <a:noFill/>
+                </a:ln>
+                <a:solidFill>
+                  <a:prstClr val="black"/>
+                </a:solidFill>
+                <a:effectLst/>
+                <a:uLnTx/>
+                <a:uFillTx/>
                 <a:latin typeface="Segoe UI" panose="020B0502040204020203" pitchFamily="34" charset="0"/>
+                <a:ea typeface="+mn-ea"/>
                 <a:cs typeface="Segoe UI" panose="020B0502040204020203" pitchFamily="34" charset="0"/>
               </a:rPr>
               <a:t>LLM</a:t>
             </a:r>
           </a:p>
           <a:p>
-            <a:pPr algn="ctr"/>
+            <a:pPr marL="0" marR="0" lvl="0" indent="0" algn="ctr" defTabSz="914400" rtl="0" eaLnBrk="1" fontAlgn="auto" latinLnBrk="0" hangingPunct="1">
+              <a:lnSpc>
+                <a:spcPct val="100000"/>
+              </a:lnSpc>
+              <a:spcBef>
+                <a:spcPts val="0"/>
+              </a:spcBef>
+              <a:spcAft>
+                <a:spcPts val="0"/>
+              </a:spcAft>
+              <a:buClrTx/>
+              <a:buSzTx/>
+              <a:buFontTx/>
+              <a:buNone/>
+              <a:tabLst/>
+              <a:defRPr/>
+            </a:pPr>
             <a:r>
-              <a:rPr lang="en-US" sz="900" dirty="0">
+              <a:rPr kumimoji="0" lang="en-US" sz="900" b="0" i="0" u="none" strike="noStrike" kern="1200" cap="none" spc="0" normalizeH="0" baseline="0" noProof="0" dirty="0">
+                <a:ln>
+                  <a:noFill/>
+                </a:ln>
+                <a:solidFill>
+                  <a:prstClr val="black"/>
+                </a:solidFill>
+                <a:effectLst/>
+                <a:uLnTx/>
+                <a:uFillTx/>
                 <a:latin typeface="Segoe UI" panose="020B0502040204020203" pitchFamily="34" charset="0"/>
+                <a:ea typeface="+mn-ea"/>
                 <a:cs typeface="Segoe UI" panose="020B0502040204020203" pitchFamily="34" charset="0"/>
               </a:rPr>
               <a:t>OpenAI</a:t>
             </a:r>
           </a:p>
           <a:p>
-            <a:pPr algn="ctr"/>
+            <a:pPr marL="0" marR="0" lvl="0" indent="0" algn="ctr" defTabSz="914400" rtl="0" eaLnBrk="1" fontAlgn="auto" latinLnBrk="0" hangingPunct="1">
+              <a:lnSpc>
+                <a:spcPct val="100000"/>
+              </a:lnSpc>
+              <a:spcBef>
+                <a:spcPts val="0"/>
+              </a:spcBef>
+              <a:spcAft>
+                <a:spcPts val="0"/>
+              </a:spcAft>
+              <a:buClrTx/>
+              <a:buSzTx/>
+              <a:buFontTx/>
+              <a:buNone/>
+              <a:tabLst/>
+              <a:defRPr/>
+            </a:pPr>
             <a:r>
-              <a:rPr lang="en-US" sz="900" dirty="0">
+              <a:rPr kumimoji="0" lang="en-US" sz="900" b="0" i="0" u="none" strike="noStrike" kern="1200" cap="none" spc="0" normalizeH="0" baseline="0" noProof="0" dirty="0">
+                <a:ln>
+                  <a:noFill/>
+                </a:ln>
+                <a:solidFill>
+                  <a:prstClr val="black"/>
+                </a:solidFill>
+                <a:effectLst/>
+                <a:uLnTx/>
+                <a:uFillTx/>
                 <a:latin typeface="Segoe UI" panose="020B0502040204020203" pitchFamily="34" charset="0"/>
+                <a:ea typeface="+mn-ea"/>
                 <a:cs typeface="Segoe UI" panose="020B0502040204020203" pitchFamily="34" charset="0"/>
               </a:rPr>
               <a:t>gpt-4o-mini</a:t>
@@ -12417,20 +12765,72 @@
           </a:bodyPr>
           <a:lstStyle/>
           <a:p>
-            <a:pPr algn="ctr"/>
+            <a:pPr marL="0" marR="0" lvl="0" indent="0" algn="ctr" defTabSz="914400" rtl="0" eaLnBrk="1" fontAlgn="auto" latinLnBrk="0" hangingPunct="1">
+              <a:lnSpc>
+                <a:spcPct val="100000"/>
+              </a:lnSpc>
+              <a:spcBef>
+                <a:spcPts val="0"/>
+              </a:spcBef>
+              <a:spcAft>
+                <a:spcPts val="0"/>
+              </a:spcAft>
+              <a:buClrTx/>
+              <a:buSzTx/>
+              <a:buFontTx/>
+              <a:buNone/>
+              <a:tabLst/>
+              <a:defRPr/>
+            </a:pPr>
             <a:r>
-              <a:rPr lang="en-US" sz="900" dirty="0">
+              <a:rPr kumimoji="0" lang="en-US" sz="900" b="0" i="0" u="none" strike="noStrike" kern="1200" cap="none" spc="0" normalizeH="0" baseline="0" noProof="0" dirty="0">
+                <a:ln>
+                  <a:noFill/>
+                </a:ln>
+                <a:solidFill>
+                  <a:prstClr val="black"/>
+                </a:solidFill>
+                <a:effectLst/>
+                <a:uLnTx/>
+                <a:uFillTx/>
                 <a:latin typeface="Segoe UI" panose="020B0502040204020203" pitchFamily="34" charset="0"/>
+                <a:ea typeface="+mn-ea"/>
                 <a:cs typeface="Segoe UI" panose="020B0502040204020203" pitchFamily="34" charset="0"/>
               </a:rPr>
               <a:t>Azure</a:t>
             </a:r>
           </a:p>
           <a:p>
-            <a:pPr algn="ctr"/>
+            <a:pPr marL="0" marR="0" lvl="0" indent="0" algn="ctr" defTabSz="914400" rtl="0" eaLnBrk="1" fontAlgn="auto" latinLnBrk="0" hangingPunct="1">
+              <a:lnSpc>
+                <a:spcPct val="100000"/>
+              </a:lnSpc>
+              <a:spcBef>
+                <a:spcPts val="0"/>
+              </a:spcBef>
+              <a:spcAft>
+                <a:spcPts val="0"/>
+              </a:spcAft>
+              <a:buClrTx/>
+              <a:buSzTx/>
+              <a:buFontTx/>
+              <a:buNone/>
+              <a:tabLst/>
+              <a:defRPr/>
+            </a:pPr>
             <a:r>
-              <a:rPr lang="en-US" sz="900" dirty="0">
+              <a:rPr kumimoji="0" lang="en-US" sz="900" b="0" i="0" u="none" strike="noStrike" kern="1200" cap="none" spc="0" normalizeH="0" baseline="0" noProof="0" dirty="0">
+                <a:ln>
+                  <a:noFill/>
+                </a:ln>
+                <a:solidFill>
+                  <a:prstClr val="black"/>
+                </a:solidFill>
+                <a:effectLst/>
+                <a:uLnTx/>
+                <a:uFillTx/>
                 <a:latin typeface="Segoe UI" panose="020B0502040204020203" pitchFamily="34" charset="0"/>
+                <a:ea typeface="+mn-ea"/>
                 <a:cs typeface="Segoe UI" panose="020B0502040204020203" pitchFamily="34" charset="0"/>
               </a:rPr>
               <a:t>AI Foundry</a:t>
@@ -12507,8 +12907,37 @@
             <a:bodyPr rtlCol="0" anchor="ctr"/>
             <a:lstStyle/>
             <a:p>
-              <a:pPr algn="ctr"/>
-              <a:endParaRPr lang="en-US"/>
+              <a:pPr marL="0" marR="0" lvl="0" indent="0" algn="ctr" defTabSz="914400" rtl="0" eaLnBrk="1" fontAlgn="auto" latinLnBrk="0" hangingPunct="1">
+                <a:lnSpc>
+                  <a:spcPct val="100000"/>
+                </a:lnSpc>
+                <a:spcBef>
+                  <a:spcPts val="0"/>
+                </a:spcBef>
+                <a:spcAft>
+                  <a:spcPts val="0"/>
+                </a:spcAft>
+                <a:buClrTx/>
+                <a:buSzTx/>
+                <a:buFontTx/>
+                <a:buNone/>
+                <a:tabLst/>
+                <a:defRPr/>
+              </a:pPr>
+              <a:endParaRPr kumimoji="0" lang="en-US" sz="1800" b="0" i="0" u="none" strike="noStrike" kern="1200" cap="none" spc="0" normalizeH="0" baseline="0" noProof="0">
+                <a:ln>
+                  <a:noFill/>
+                </a:ln>
+                <a:solidFill>
+                  <a:prstClr val="white"/>
+                </a:solidFill>
+                <a:effectLst/>
+                <a:uLnTx/>
+                <a:uFillTx/>
+                <a:latin typeface="Aptos" panose="02110004020202020204"/>
+                <a:ea typeface="+mn-ea"/>
+                <a:cs typeface="+mn-cs"/>
+              </a:endParaRPr>
             </a:p>
           </p:txBody>
         </p:sp>
@@ -12561,8 +12990,37 @@
             <a:bodyPr rtlCol="0" anchor="ctr"/>
             <a:lstStyle/>
             <a:p>
-              <a:pPr algn="ctr"/>
-              <a:endParaRPr lang="en-US"/>
+              <a:pPr marL="0" marR="0" lvl="0" indent="0" algn="ctr" defTabSz="914400" rtl="0" eaLnBrk="1" fontAlgn="auto" latinLnBrk="0" hangingPunct="1">
+                <a:lnSpc>
+                  <a:spcPct val="100000"/>
+                </a:lnSpc>
+                <a:spcBef>
+                  <a:spcPts val="0"/>
+                </a:spcBef>
+                <a:spcAft>
+                  <a:spcPts val="0"/>
+                </a:spcAft>
+                <a:buClrTx/>
+                <a:buSzTx/>
+                <a:buFontTx/>
+                <a:buNone/>
+                <a:tabLst/>
+                <a:defRPr/>
+              </a:pPr>
+              <a:endParaRPr kumimoji="0" lang="en-US" sz="1800" b="0" i="0" u="none" strike="noStrike" kern="1200" cap="none" spc="0" normalizeH="0" baseline="0" noProof="0">
+                <a:ln>
+                  <a:noFill/>
+                </a:ln>
+                <a:solidFill>
+                  <a:prstClr val="white"/>
+                </a:solidFill>
+                <a:effectLst/>
+                <a:uLnTx/>
+                <a:uFillTx/>
+                <a:latin typeface="Aptos" panose="02110004020202020204"/>
+                <a:ea typeface="+mn-ea"/>
+                <a:cs typeface="+mn-cs"/>
+              </a:endParaRPr>
             </a:p>
           </p:txBody>
         </p:sp>
@@ -12615,8 +13073,37 @@
             <a:bodyPr rtlCol="0" anchor="ctr"/>
             <a:lstStyle/>
             <a:p>
-              <a:pPr algn="ctr"/>
-              <a:endParaRPr lang="en-US"/>
+              <a:pPr marL="0" marR="0" lvl="0" indent="0" algn="ctr" defTabSz="914400" rtl="0" eaLnBrk="1" fontAlgn="auto" latinLnBrk="0" hangingPunct="1">
+                <a:lnSpc>
+                  <a:spcPct val="100000"/>
+                </a:lnSpc>
+                <a:spcBef>
+                  <a:spcPts val="0"/>
+                </a:spcBef>
+                <a:spcAft>
+                  <a:spcPts val="0"/>
+                </a:spcAft>
+                <a:buClrTx/>
+                <a:buSzTx/>
+                <a:buFontTx/>
+                <a:buNone/>
+                <a:tabLst/>
+                <a:defRPr/>
+              </a:pPr>
+              <a:endParaRPr kumimoji="0" lang="en-US" sz="1800" b="0" i="0" u="none" strike="noStrike" kern="1200" cap="none" spc="0" normalizeH="0" baseline="0" noProof="0">
+                <a:ln>
+                  <a:noFill/>
+                </a:ln>
+                <a:solidFill>
+                  <a:prstClr val="white"/>
+                </a:solidFill>
+                <a:effectLst/>
+                <a:uLnTx/>
+                <a:uFillTx/>
+                <a:latin typeface="Aptos" panose="02110004020202020204"/>
+                <a:ea typeface="+mn-ea"/>
+                <a:cs typeface="+mn-cs"/>
+              </a:endParaRPr>
             </a:p>
           </p:txBody>
         </p:sp>
@@ -12624,7 +13111,84 @@
     </p:spTree>
     <p:extLst>
       <p:ext uri="{BB962C8B-B14F-4D97-AF65-F5344CB8AC3E}">
-        <p14:creationId xmlns:p14="http://schemas.microsoft.com/office/powerpoint/2010/main" val="2428662692"/>
+        <p14:creationId xmlns:p14="http://schemas.microsoft.com/office/powerpoint/2010/main" val="1649847297"/>
+      </p:ext>
+    </p:extLst>
+  </p:cSld>
+  <p:clrMapOvr>
+    <a:masterClrMapping/>
+  </p:clrMapOvr>
+</p:sld>
+</file>
+
+<file path=ppt/slides/slide3.xml><?xml version="1.0" encoding="utf-8"?>
+<p:sld xmlns:a="http://schemas.openxmlformats.org/drawingml/2006/main" xmlns:r="http://schemas.openxmlformats.org/officeDocument/2006/relationships" xmlns:p="http://schemas.openxmlformats.org/presentationml/2006/main">
+  <p:cSld>
+    <p:spTree>
+      <p:nvGrpSpPr>
+        <p:cNvPr id="1" name=""/>
+        <p:cNvGrpSpPr/>
+        <p:nvPr/>
+      </p:nvGrpSpPr>
+      <p:grpSpPr>
+        <a:xfrm>
+          <a:off x="0" y="0"/>
+          <a:ext cx="0" cy="0"/>
+          <a:chOff x="0" y="0"/>
+          <a:chExt cx="0" cy="0"/>
+        </a:xfrm>
+      </p:grpSpPr>
+      <p:pic>
+        <p:nvPicPr>
+          <p:cNvPr id="14338" name="Picture 2" descr="graphical user interface, diagram">
+            <a:extLst>
+              <a:ext uri="{FF2B5EF4-FFF2-40B4-BE49-F238E27FC236}">
+                <a16:creationId xmlns:a16="http://schemas.microsoft.com/office/drawing/2014/main" id="{84758CDD-75DB-1B40-9B14-7C3D29416FA7}"/>
+              </a:ext>
+            </a:extLst>
+          </p:cNvPr>
+          <p:cNvPicPr>
+            <a:picLocks noChangeAspect="1" noChangeArrowheads="1"/>
+          </p:cNvPicPr>
+          <p:nvPr/>
+        </p:nvPicPr>
+        <p:blipFill>
+          <a:blip r:embed="rId2">
+            <a:extLst>
+              <a:ext uri="{28A0092B-C50C-407E-A947-70E740481C1C}">
+                <a14:useLocalDpi xmlns:a14="http://schemas.microsoft.com/office/drawing/2010/main" val="0"/>
+              </a:ext>
+            </a:extLst>
+          </a:blip>
+          <a:srcRect/>
+          <a:stretch>
+            <a:fillRect/>
+          </a:stretch>
+        </p:blipFill>
+        <p:spPr bwMode="auto">
+          <a:xfrm>
+            <a:off x="0" y="0"/>
+            <a:ext cx="12192000" cy="13871332"/>
+          </a:xfrm>
+          <a:prstGeom prst="rect">
+            <a:avLst/>
+          </a:prstGeom>
+          <a:noFill/>
+          <a:extLst>
+            <a:ext uri="{909E8E84-426E-40DD-AFC4-6F175D3DCCD1}">
+              <a14:hiddenFill xmlns:a14="http://schemas.microsoft.com/office/drawing/2010/main">
+                <a:solidFill>
+                  <a:srgbClr val="FFFFFF"/>
+                </a:solidFill>
+              </a14:hiddenFill>
+            </a:ext>
+          </a:extLst>
+        </p:spPr>
+      </p:pic>
+    </p:spTree>
+    <p:extLst>
+      <p:ext uri="{BB962C8B-B14F-4D97-AF65-F5344CB8AC3E}">
+        <p14:creationId xmlns:p14="http://schemas.microsoft.com/office/powerpoint/2010/main" val="3853870372"/>
       </p:ext>
     </p:extLst>
   </p:cSld>
@@ -12653,83 +13217,6 @@
       </p:grpSpPr>
       <p:pic>
         <p:nvPicPr>
-          <p:cNvPr id="14338" name="Picture 2" descr="graphical user interface, diagram">
-            <a:extLst>
-              <a:ext uri="{FF2B5EF4-FFF2-40B4-BE49-F238E27FC236}">
-                <a16:creationId xmlns:a16="http://schemas.microsoft.com/office/drawing/2014/main" id="{84758CDD-75DB-1B40-9B14-7C3D29416FA7}"/>
-              </a:ext>
-            </a:extLst>
-          </p:cNvPr>
-          <p:cNvPicPr>
-            <a:picLocks noChangeAspect="1" noChangeArrowheads="1"/>
-          </p:cNvPicPr>
-          <p:nvPr/>
-        </p:nvPicPr>
-        <p:blipFill>
-          <a:blip r:embed="rId2">
-            <a:extLst>
-              <a:ext uri="{28A0092B-C50C-407E-A947-70E740481C1C}">
-                <a14:useLocalDpi xmlns:a14="http://schemas.microsoft.com/office/drawing/2010/main" val="0"/>
-              </a:ext>
-            </a:extLst>
-          </a:blip>
-          <a:srcRect/>
-          <a:stretch>
-            <a:fillRect/>
-          </a:stretch>
-        </p:blipFill>
-        <p:spPr bwMode="auto">
-          <a:xfrm>
-            <a:off x="0" y="0"/>
-            <a:ext cx="12192000" cy="13871332"/>
-          </a:xfrm>
-          <a:prstGeom prst="rect">
-            <a:avLst/>
-          </a:prstGeom>
-          <a:noFill/>
-          <a:extLst>
-            <a:ext uri="{909E8E84-426E-40DD-AFC4-6F175D3DCCD1}">
-              <a14:hiddenFill xmlns:a14="http://schemas.microsoft.com/office/drawing/2010/main">
-                <a:solidFill>
-                  <a:srgbClr val="FFFFFF"/>
-                </a:solidFill>
-              </a14:hiddenFill>
-            </a:ext>
-          </a:extLst>
-        </p:spPr>
-      </p:pic>
-    </p:spTree>
-    <p:extLst>
-      <p:ext uri="{BB962C8B-B14F-4D97-AF65-F5344CB8AC3E}">
-        <p14:creationId xmlns:p14="http://schemas.microsoft.com/office/powerpoint/2010/main" val="3853870372"/>
-      </p:ext>
-    </p:extLst>
-  </p:cSld>
-  <p:clrMapOvr>
-    <a:masterClrMapping/>
-  </p:clrMapOvr>
-</p:sld>
-</file>
-
-<file path=ppt/slides/slide5.xml><?xml version="1.0" encoding="utf-8"?>
-<p:sld xmlns:a="http://schemas.openxmlformats.org/drawingml/2006/main" xmlns:r="http://schemas.openxmlformats.org/officeDocument/2006/relationships" xmlns:p="http://schemas.openxmlformats.org/presentationml/2006/main">
-  <p:cSld>
-    <p:spTree>
-      <p:nvGrpSpPr>
-        <p:cNvPr id="1" name=""/>
-        <p:cNvGrpSpPr/>
-        <p:nvPr/>
-      </p:nvGrpSpPr>
-      <p:grpSpPr>
-        <a:xfrm>
-          <a:off x="0" y="0"/>
-          <a:ext cx="0" cy="0"/>
-          <a:chOff x="0" y="0"/>
-          <a:chExt cx="0" cy="0"/>
-        </a:xfrm>
-      </p:grpSpPr>
-      <p:pic>
-        <p:nvPicPr>
           <p:cNvPr id="4" name="Picture 2" descr="graphical user interface, diagram">
             <a:extLst>
               <a:ext uri="{FF2B5EF4-FFF2-40B4-BE49-F238E27FC236}">
@@ -12788,7 +13275,7 @@
 </p:sld>
 </file>
 
-<file path=ppt/slides/slide6.xml><?xml version="1.0" encoding="utf-8"?>
+<file path=ppt/slides/slide5.xml><?xml version="1.0" encoding="utf-8"?>
 <p:sld xmlns:a="http://schemas.openxmlformats.org/drawingml/2006/main" xmlns:r="http://schemas.openxmlformats.org/officeDocument/2006/relationships" xmlns:p="http://schemas.openxmlformats.org/presentationml/2006/main">
   <p:cSld>
     <p:spTree>
@@ -12862,6 +13349,83 @@
     <p:extLst>
       <p:ext uri="{BB962C8B-B14F-4D97-AF65-F5344CB8AC3E}">
         <p14:creationId xmlns:p14="http://schemas.microsoft.com/office/powerpoint/2010/main" val="2075511828"/>
+      </p:ext>
+    </p:extLst>
+  </p:cSld>
+  <p:clrMapOvr>
+    <a:masterClrMapping/>
+  </p:clrMapOvr>
+</p:sld>
+</file>
+
+<file path=ppt/slides/slide6.xml><?xml version="1.0" encoding="utf-8"?>
+<p:sld xmlns:a="http://schemas.openxmlformats.org/drawingml/2006/main" xmlns:r="http://schemas.openxmlformats.org/officeDocument/2006/relationships" xmlns:p="http://schemas.openxmlformats.org/presentationml/2006/main">
+  <p:cSld>
+    <p:spTree>
+      <p:nvGrpSpPr>
+        <p:cNvPr id="1" name=""/>
+        <p:cNvGrpSpPr/>
+        <p:nvPr/>
+      </p:nvGrpSpPr>
+      <p:grpSpPr>
+        <a:xfrm>
+          <a:off x="0" y="0"/>
+          <a:ext cx="0" cy="0"/>
+          <a:chOff x="0" y="0"/>
+          <a:chExt cx="0" cy="0"/>
+        </a:xfrm>
+      </p:grpSpPr>
+      <p:pic>
+        <p:nvPicPr>
+          <p:cNvPr id="15362" name="Picture 2" descr="Azure AI Foundry with Semantic Kernel Demo architecture">
+            <a:extLst>
+              <a:ext uri="{FF2B5EF4-FFF2-40B4-BE49-F238E27FC236}">
+                <a16:creationId xmlns:a16="http://schemas.microsoft.com/office/drawing/2014/main" id="{C14B7479-3B26-B294-0067-1A4D17B94D8F}"/>
+              </a:ext>
+            </a:extLst>
+          </p:cNvPr>
+          <p:cNvPicPr>
+            <a:picLocks noChangeAspect="1" noChangeArrowheads="1"/>
+          </p:cNvPicPr>
+          <p:nvPr/>
+        </p:nvPicPr>
+        <p:blipFill>
+          <a:blip r:embed="rId2">
+            <a:extLst>
+              <a:ext uri="{28A0092B-C50C-407E-A947-70E740481C1C}">
+                <a14:useLocalDpi xmlns:a14="http://schemas.microsoft.com/office/drawing/2010/main" val="0"/>
+              </a:ext>
+            </a:extLst>
+          </a:blip>
+          <a:srcRect/>
+          <a:stretch>
+            <a:fillRect/>
+          </a:stretch>
+        </p:blipFill>
+        <p:spPr bwMode="auto">
+          <a:xfrm>
+            <a:off x="545203" y="164617"/>
+            <a:ext cx="11563217" cy="6156670"/>
+          </a:xfrm>
+          <a:prstGeom prst="rect">
+            <a:avLst/>
+          </a:prstGeom>
+          <a:noFill/>
+          <a:extLst>
+            <a:ext uri="{909E8E84-426E-40DD-AFC4-6F175D3DCCD1}">
+              <a14:hiddenFill xmlns:a14="http://schemas.microsoft.com/office/drawing/2010/main">
+                <a:solidFill>
+                  <a:srgbClr val="FFFFFF"/>
+                </a:solidFill>
+              </a14:hiddenFill>
+            </a:ext>
+          </a:extLst>
+        </p:spPr>
+      </p:pic>
+    </p:spTree>
+    <p:extLst>
+      <p:ext uri="{BB962C8B-B14F-4D97-AF65-F5344CB8AC3E}">
+        <p14:creationId xmlns:p14="http://schemas.microsoft.com/office/powerpoint/2010/main" val="37654488"/>
       </p:ext>
     </p:extLst>
   </p:cSld>
@@ -12888,12 +13452,62 @@
           <a:chExt cx="0" cy="0"/>
         </a:xfrm>
       </p:grpSpPr>
+      <p:sp>
+        <p:nvSpPr>
+          <p:cNvPr id="2" name="Title 1">
+            <a:extLst>
+              <a:ext uri="{FF2B5EF4-FFF2-40B4-BE49-F238E27FC236}">
+                <a16:creationId xmlns:a16="http://schemas.microsoft.com/office/drawing/2014/main" id="{6F2D52EC-989E-38A3-18FC-B6588A25EF22}"/>
+              </a:ext>
+            </a:extLst>
+          </p:cNvPr>
+          <p:cNvSpPr>
+            <a:spLocks noGrp="1"/>
+          </p:cNvSpPr>
+          <p:nvPr>
+            <p:ph type="title"/>
+          </p:nvPr>
+        </p:nvSpPr>
+        <p:spPr/>
+        <p:txBody>
+          <a:bodyPr/>
+          <a:lstStyle/>
+          <a:p>
+            <a:endParaRPr lang="en-US"/>
+          </a:p>
+        </p:txBody>
+      </p:sp>
+      <p:sp>
+        <p:nvSpPr>
+          <p:cNvPr id="3" name="Content Placeholder 2">
+            <a:extLst>
+              <a:ext uri="{FF2B5EF4-FFF2-40B4-BE49-F238E27FC236}">
+                <a16:creationId xmlns:a16="http://schemas.microsoft.com/office/drawing/2014/main" id="{BABCEBDF-F226-2E1C-B3D6-EEBDFBCB73C5}"/>
+              </a:ext>
+            </a:extLst>
+          </p:cNvPr>
+          <p:cNvSpPr>
+            <a:spLocks noGrp="1"/>
+          </p:cNvSpPr>
+          <p:nvPr>
+            <p:ph idx="1"/>
+          </p:nvPr>
+        </p:nvSpPr>
+        <p:spPr/>
+        <p:txBody>
+          <a:bodyPr/>
+          <a:lstStyle/>
+          <a:p>
+            <a:endParaRPr lang="en-US"/>
+          </a:p>
+        </p:txBody>
+      </p:sp>
       <p:pic>
         <p:nvPicPr>
-          <p:cNvPr id="15362" name="Picture 2" descr="Azure AI Foundry with Semantic Kernel Demo architecture">
-            <a:extLst>
-              <a:ext uri="{FF2B5EF4-FFF2-40B4-BE49-F238E27FC236}">
-                <a16:creationId xmlns:a16="http://schemas.microsoft.com/office/drawing/2014/main" id="{C14B7479-3B26-B294-0067-1A4D17B94D8F}"/>
+          <p:cNvPr id="8194" name="Picture 2" descr="AutoGen Overview">
+            <a:extLst>
+              <a:ext uri="{FF2B5EF4-FFF2-40B4-BE49-F238E27FC236}">
+                <a16:creationId xmlns:a16="http://schemas.microsoft.com/office/drawing/2014/main" id="{246B6185-ED15-2BA3-8FC9-1DD98AAC5E26}"/>
               </a:ext>
             </a:extLst>
           </p:cNvPr>
@@ -12917,8 +13531,8 @@
         </p:blipFill>
         <p:spPr bwMode="auto">
           <a:xfrm>
-            <a:off x="545203" y="164617"/>
-            <a:ext cx="11563217" cy="6156670"/>
+            <a:off x="0" y="504825"/>
+            <a:ext cx="12192000" cy="5848350"/>
           </a:xfrm>
           <a:prstGeom prst="rect">
             <a:avLst/>
@@ -12938,7 +13552,7 @@
     </p:spTree>
     <p:extLst>
       <p:ext uri="{BB962C8B-B14F-4D97-AF65-F5344CB8AC3E}">
-        <p14:creationId xmlns:p14="http://schemas.microsoft.com/office/powerpoint/2010/main" val="37654488"/>
+        <p14:creationId xmlns:p14="http://schemas.microsoft.com/office/powerpoint/2010/main" val="2141134589"/>
       </p:ext>
     </p:extLst>
   </p:cSld>
@@ -12970,7 +13584,7 @@
           <p:cNvPr id="2" name="Title 1">
             <a:extLst>
               <a:ext uri="{FF2B5EF4-FFF2-40B4-BE49-F238E27FC236}">
-                <a16:creationId xmlns:a16="http://schemas.microsoft.com/office/drawing/2014/main" id="{6F2D52EC-989E-38A3-18FC-B6588A25EF22}"/>
+                <a16:creationId xmlns:a16="http://schemas.microsoft.com/office/drawing/2014/main" id="{ACE3B8B6-1CFE-386A-3B2D-0771FE5DCFA3}"/>
               </a:ext>
             </a:extLst>
           </p:cNvPr>
@@ -12995,7 +13609,7 @@
           <p:cNvPr id="3" name="Content Placeholder 2">
             <a:extLst>
               <a:ext uri="{FF2B5EF4-FFF2-40B4-BE49-F238E27FC236}">
-                <a16:creationId xmlns:a16="http://schemas.microsoft.com/office/drawing/2014/main" id="{BABCEBDF-F226-2E1C-B3D6-EEBDFBCB73C5}"/>
+                <a16:creationId xmlns:a16="http://schemas.microsoft.com/office/drawing/2014/main" id="{BFEF6532-5296-8E22-E116-BC0BCF4AEFF7}"/>
               </a:ext>
             </a:extLst>
           </p:cNvPr>
@@ -13017,10 +13631,10 @@
       </p:sp>
       <p:pic>
         <p:nvPicPr>
-          <p:cNvPr id="8194" name="Picture 2" descr="AutoGen Overview">
-            <a:extLst>
-              <a:ext uri="{FF2B5EF4-FFF2-40B4-BE49-F238E27FC236}">
-                <a16:creationId xmlns:a16="http://schemas.microsoft.com/office/drawing/2014/main" id="{246B6185-ED15-2BA3-8FC9-1DD98AAC5E26}"/>
+          <p:cNvPr id="6148" name="Picture 4" descr="Applications">
+            <a:extLst>
+              <a:ext uri="{FF2B5EF4-FFF2-40B4-BE49-F238E27FC236}">
+                <a16:creationId xmlns:a16="http://schemas.microsoft.com/office/drawing/2014/main" id="{AD6103CE-DE87-A18E-F09F-05468A235EB3}"/>
               </a:ext>
             </a:extLst>
           </p:cNvPr>
@@ -13044,8 +13658,8 @@
         </p:blipFill>
         <p:spPr bwMode="auto">
           <a:xfrm>
-            <a:off x="0" y="504825"/>
-            <a:ext cx="12192000" cy="5848350"/>
+            <a:off x="0" y="552450"/>
+            <a:ext cx="12192000" cy="5753100"/>
           </a:xfrm>
           <a:prstGeom prst="rect">
             <a:avLst/>
@@ -13065,7 +13679,7 @@
     </p:spTree>
     <p:extLst>
       <p:ext uri="{BB962C8B-B14F-4D97-AF65-F5344CB8AC3E}">
-        <p14:creationId xmlns:p14="http://schemas.microsoft.com/office/powerpoint/2010/main" val="2141134589"/>
+        <p14:creationId xmlns:p14="http://schemas.microsoft.com/office/powerpoint/2010/main" val="424269342"/>
       </p:ext>
     </p:extLst>
   </p:cSld>
@@ -13097,7 +13711,7 @@
           <p:cNvPr id="2" name="Title 1">
             <a:extLst>
               <a:ext uri="{FF2B5EF4-FFF2-40B4-BE49-F238E27FC236}">
-                <a16:creationId xmlns:a16="http://schemas.microsoft.com/office/drawing/2014/main" id="{ACE3B8B6-1CFE-386A-3B2D-0771FE5DCFA3}"/>
+                <a16:creationId xmlns:a16="http://schemas.microsoft.com/office/drawing/2014/main" id="{18F2992B-CA16-F732-78BE-ADAF881FB173}"/>
               </a:ext>
             </a:extLst>
           </p:cNvPr>
@@ -13122,7 +13736,7 @@
           <p:cNvPr id="3" name="Content Placeholder 2">
             <a:extLst>
               <a:ext uri="{FF2B5EF4-FFF2-40B4-BE49-F238E27FC236}">
-                <a16:creationId xmlns:a16="http://schemas.microsoft.com/office/drawing/2014/main" id="{BFEF6532-5296-8E22-E116-BC0BCF4AEFF7}"/>
+                <a16:creationId xmlns:a16="http://schemas.microsoft.com/office/drawing/2014/main" id="{85255165-55C0-639B-ADB5-8B2D62865387}"/>
               </a:ext>
             </a:extLst>
           </p:cNvPr>
@@ -13144,10 +13758,10 @@
       </p:sp>
       <p:pic>
         <p:nvPicPr>
-          <p:cNvPr id="6148" name="Picture 4" descr="Applications">
-            <a:extLst>
-              <a:ext uri="{FF2B5EF4-FFF2-40B4-BE49-F238E27FC236}">
-                <a16:creationId xmlns:a16="http://schemas.microsoft.com/office/drawing/2014/main" id="{AD6103CE-DE87-A18E-F09F-05468A235EB3}"/>
+          <p:cNvPr id="7170" name="Picture 2" descr="Agent Chat Example">
+            <a:extLst>
+              <a:ext uri="{FF2B5EF4-FFF2-40B4-BE49-F238E27FC236}">
+                <a16:creationId xmlns:a16="http://schemas.microsoft.com/office/drawing/2014/main" id="{7D1FE7EF-6D52-914B-EFF1-17A8E2B8258A}"/>
               </a:ext>
             </a:extLst>
           </p:cNvPr>
@@ -13171,8 +13785,8 @@
         </p:blipFill>
         <p:spPr bwMode="auto">
           <a:xfrm>
-            <a:off x="0" y="552450"/>
-            <a:ext cx="12192000" cy="5753100"/>
+            <a:off x="0" y="176213"/>
+            <a:ext cx="12192000" cy="6505575"/>
           </a:xfrm>
           <a:prstGeom prst="rect">
             <a:avLst/>
@@ -13192,7 +13806,7 @@
     </p:spTree>
     <p:extLst>
       <p:ext uri="{BB962C8B-B14F-4D97-AF65-F5344CB8AC3E}">
-        <p14:creationId xmlns:p14="http://schemas.microsoft.com/office/powerpoint/2010/main" val="424269342"/>
+        <p14:creationId xmlns:p14="http://schemas.microsoft.com/office/powerpoint/2010/main" val="1520221962"/>
       </p:ext>
     </p:extLst>
   </p:cSld>

</xml_diff>